<commit_message>
Implemented safety checking and absolute target liveness functions and everything needed for the functions in the frame work of the TFM.
</commit_message>
<xml_diff>
--- a/docs/Airspace Structure.pptx
+++ b/docs/Airspace Structure.pptx
@@ -7,6 +7,11 @@
   <p:sldIdLst>
     <p:sldId id="256" r:id="rId2"/>
     <p:sldId id="257" r:id="rId3"/>
+    <p:sldId id="258" r:id="rId4"/>
+    <p:sldId id="259" r:id="rId5"/>
+    <p:sldId id="262" r:id="rId6"/>
+    <p:sldId id="260" r:id="rId7"/>
+    <p:sldId id="261" r:id="rId8"/>
   </p:sldIdLst>
   <p:sldSz cx="12192000" cy="6858000"/>
   <p:notesSz cx="6858000" cy="9144000"/>
@@ -2972,574 +2977,13 @@
       </p:grpSpPr>
       <p:grpSp>
         <p:nvGrpSpPr>
-          <p:cNvPr id="15" name="Group 14"/>
-          <p:cNvGrpSpPr/>
-          <p:nvPr/>
-        </p:nvGrpSpPr>
-        <p:grpSpPr>
-          <a:xfrm>
-            <a:off x="216414" y="3547696"/>
-            <a:ext cx="3510844" cy="3070578"/>
-            <a:chOff x="5040489" y="824089"/>
-            <a:chExt cx="3510844" cy="3070578"/>
-          </a:xfrm>
-        </p:grpSpPr>
-        <p:sp>
-          <p:nvSpPr>
-            <p:cNvPr id="7" name="Rounded Rectangle 6"/>
-            <p:cNvSpPr/>
-            <p:nvPr/>
-          </p:nvSpPr>
-          <p:spPr>
-            <a:xfrm>
-              <a:off x="5040489" y="824089"/>
-              <a:ext cx="3510844" cy="3070578"/>
-            </a:xfrm>
-            <a:prstGeom prst="roundRect">
-              <a:avLst/>
-            </a:prstGeom>
-          </p:spPr>
-          <p:style>
-            <a:lnRef idx="2">
-              <a:schemeClr val="accent1">
-                <a:shade val="50000"/>
-              </a:schemeClr>
-            </a:lnRef>
-            <a:fillRef idx="1">
-              <a:schemeClr val="accent1"/>
-            </a:fillRef>
-            <a:effectRef idx="0">
-              <a:schemeClr val="accent1"/>
-            </a:effectRef>
-            <a:fontRef idx="minor">
-              <a:schemeClr val="lt1"/>
-            </a:fontRef>
-          </p:style>
-          <p:txBody>
-            <a:bodyPr rtlCol="0" anchor="ctr"/>
-            <a:lstStyle/>
-            <a:p>
-              <a:pPr algn="ctr"/>
-              <a:endParaRPr lang="en-US"/>
-            </a:p>
-          </p:txBody>
-        </p:sp>
-        <p:sp>
-          <p:nvSpPr>
-            <p:cNvPr id="8" name="Rectangle 7"/>
-            <p:cNvSpPr/>
-            <p:nvPr/>
-          </p:nvSpPr>
-          <p:spPr>
-            <a:xfrm>
-              <a:off x="5470144" y="1138765"/>
-              <a:ext cx="1026612" cy="776111"/>
-            </a:xfrm>
-            <a:prstGeom prst="rect">
-              <a:avLst/>
-            </a:prstGeom>
-          </p:spPr>
-          <p:style>
-            <a:lnRef idx="2">
-              <a:schemeClr val="accent6">
-                <a:shade val="50000"/>
-              </a:schemeClr>
-            </a:lnRef>
-            <a:fillRef idx="1">
-              <a:schemeClr val="accent6"/>
-            </a:fillRef>
-            <a:effectRef idx="0">
-              <a:schemeClr val="accent6"/>
-            </a:effectRef>
-            <a:fontRef idx="minor">
-              <a:schemeClr val="lt1"/>
-            </a:fontRef>
-          </p:style>
-          <p:txBody>
-            <a:bodyPr rtlCol="0" anchor="ctr"/>
-            <a:lstStyle/>
-            <a:p>
-              <a:pPr algn="ctr"/>
-              <a:r>
-                <a:rPr lang="en-US" dirty="0" smtClean="0"/>
-                <a:t>Highway</a:t>
-              </a:r>
-              <a:endParaRPr lang="en-US" dirty="0"/>
-            </a:p>
-          </p:txBody>
-        </p:sp>
-        <p:sp>
-          <p:nvSpPr>
-            <p:cNvPr id="9" name="Oval 8"/>
-            <p:cNvSpPr/>
-            <p:nvPr/>
-          </p:nvSpPr>
-          <p:spPr>
-            <a:xfrm>
-              <a:off x="5221111" y="2229552"/>
-              <a:ext cx="1275645" cy="1061156"/>
-            </a:xfrm>
-            <a:prstGeom prst="ellipse">
-              <a:avLst/>
-            </a:prstGeom>
-          </p:spPr>
-          <p:style>
-            <a:lnRef idx="2">
-              <a:schemeClr val="accent2">
-                <a:shade val="50000"/>
-              </a:schemeClr>
-            </a:lnRef>
-            <a:fillRef idx="1">
-              <a:schemeClr val="accent2"/>
-            </a:fillRef>
-            <a:effectRef idx="0">
-              <a:schemeClr val="accent2"/>
-            </a:effectRef>
-            <a:fontRef idx="minor">
-              <a:schemeClr val="lt1"/>
-            </a:fontRef>
-          </p:style>
-          <p:txBody>
-            <a:bodyPr rtlCol="0" anchor="ctr"/>
-            <a:lstStyle/>
-            <a:p>
-              <a:pPr algn="ctr"/>
-              <a:r>
-                <a:rPr lang="en-US" smtClean="0"/>
-                <a:t>Platoon</a:t>
-              </a:r>
-              <a:endParaRPr lang="en-US" dirty="0"/>
-            </a:p>
-          </p:txBody>
-        </p:sp>
-        <p:sp>
-          <p:nvSpPr>
-            <p:cNvPr id="13" name="Oval 12"/>
-            <p:cNvSpPr/>
-            <p:nvPr/>
-          </p:nvSpPr>
-          <p:spPr>
-            <a:xfrm>
-              <a:off x="6795911" y="1298222"/>
-              <a:ext cx="1275645" cy="1061156"/>
-            </a:xfrm>
-            <a:prstGeom prst="ellipse">
-              <a:avLst/>
-            </a:prstGeom>
-          </p:spPr>
-          <p:style>
-            <a:lnRef idx="2">
-              <a:schemeClr val="accent2">
-                <a:shade val="50000"/>
-              </a:schemeClr>
-            </a:lnRef>
-            <a:fillRef idx="1">
-              <a:schemeClr val="accent2"/>
-            </a:fillRef>
-            <a:effectRef idx="0">
-              <a:schemeClr val="accent2"/>
-            </a:effectRef>
-            <a:fontRef idx="minor">
-              <a:schemeClr val="lt1"/>
-            </a:fontRef>
-          </p:style>
-          <p:txBody>
-            <a:bodyPr rtlCol="0" anchor="ctr"/>
-            <a:lstStyle/>
-            <a:p>
-              <a:pPr algn="ctr"/>
-              <a:r>
-                <a:rPr lang="en-US" smtClean="0"/>
-                <a:t>Platoon</a:t>
-              </a:r>
-              <a:endParaRPr lang="en-US" dirty="0"/>
-            </a:p>
-          </p:txBody>
-        </p:sp>
-      </p:grpSp>
-      <p:grpSp>
-        <p:nvGrpSpPr>
-          <p:cNvPr id="16" name="Group 15"/>
-          <p:cNvGrpSpPr/>
-          <p:nvPr/>
-        </p:nvGrpSpPr>
-        <p:grpSpPr>
-          <a:xfrm>
-            <a:off x="3857474" y="3547696"/>
-            <a:ext cx="3510844" cy="3070578"/>
-            <a:chOff x="8551333" y="3279419"/>
-            <a:chExt cx="3510844" cy="3070578"/>
-          </a:xfrm>
-        </p:grpSpPr>
-        <p:sp>
-          <p:nvSpPr>
-            <p:cNvPr id="10" name="Rounded Rectangle 9"/>
-            <p:cNvSpPr/>
-            <p:nvPr/>
-          </p:nvSpPr>
-          <p:spPr>
-            <a:xfrm>
-              <a:off x="8551333" y="3279419"/>
-              <a:ext cx="3510844" cy="3070578"/>
-            </a:xfrm>
-            <a:prstGeom prst="roundRect">
-              <a:avLst/>
-            </a:prstGeom>
-          </p:spPr>
-          <p:style>
-            <a:lnRef idx="2">
-              <a:schemeClr val="accent1">
-                <a:shade val="50000"/>
-              </a:schemeClr>
-            </a:lnRef>
-            <a:fillRef idx="1">
-              <a:schemeClr val="accent1"/>
-            </a:fillRef>
-            <a:effectRef idx="0">
-              <a:schemeClr val="accent1"/>
-            </a:effectRef>
-            <a:fontRef idx="minor">
-              <a:schemeClr val="lt1"/>
-            </a:fontRef>
-          </p:style>
-          <p:txBody>
-            <a:bodyPr rtlCol="0" anchor="ctr"/>
-            <a:lstStyle/>
-            <a:p>
-              <a:pPr algn="ctr"/>
-              <a:endParaRPr lang="en-US"/>
-            </a:p>
-          </p:txBody>
-        </p:sp>
-        <p:sp>
-          <p:nvSpPr>
-            <p:cNvPr id="11" name="Rectangle 10"/>
-            <p:cNvSpPr/>
-            <p:nvPr/>
-          </p:nvSpPr>
-          <p:spPr>
-            <a:xfrm>
-              <a:off x="8980988" y="3594095"/>
-              <a:ext cx="1026612" cy="776111"/>
-            </a:xfrm>
-            <a:prstGeom prst="rect">
-              <a:avLst/>
-            </a:prstGeom>
-          </p:spPr>
-          <p:style>
-            <a:lnRef idx="2">
-              <a:schemeClr val="accent6">
-                <a:shade val="50000"/>
-              </a:schemeClr>
-            </a:lnRef>
-            <a:fillRef idx="1">
-              <a:schemeClr val="accent6"/>
-            </a:fillRef>
-            <a:effectRef idx="0">
-              <a:schemeClr val="accent6"/>
-            </a:effectRef>
-            <a:fontRef idx="minor">
-              <a:schemeClr val="lt1"/>
-            </a:fontRef>
-          </p:style>
-          <p:txBody>
-            <a:bodyPr rtlCol="0" anchor="ctr"/>
-            <a:lstStyle/>
-            <a:p>
-              <a:pPr algn="ctr"/>
-              <a:r>
-                <a:rPr lang="en-US" dirty="0" smtClean="0"/>
-                <a:t>Platoon</a:t>
-              </a:r>
-              <a:endParaRPr lang="en-US" dirty="0"/>
-            </a:p>
-          </p:txBody>
-        </p:sp>
-        <p:sp>
-          <p:nvSpPr>
-            <p:cNvPr id="12" name="Oval 11"/>
-            <p:cNvSpPr/>
-            <p:nvPr/>
-          </p:nvSpPr>
-          <p:spPr>
-            <a:xfrm>
-              <a:off x="8731955" y="4684882"/>
-              <a:ext cx="1275645" cy="1061156"/>
-            </a:xfrm>
-            <a:prstGeom prst="ellipse">
-              <a:avLst/>
-            </a:prstGeom>
-          </p:spPr>
-          <p:style>
-            <a:lnRef idx="2">
-              <a:schemeClr val="accent2">
-                <a:shade val="50000"/>
-              </a:schemeClr>
-            </a:lnRef>
-            <a:fillRef idx="1">
-              <a:schemeClr val="accent2"/>
-            </a:fillRef>
-            <a:effectRef idx="0">
-              <a:schemeClr val="accent2"/>
-            </a:effectRef>
-            <a:fontRef idx="minor">
-              <a:schemeClr val="lt1"/>
-            </a:fontRef>
-          </p:style>
-          <p:txBody>
-            <a:bodyPr rtlCol="0" anchor="ctr"/>
-            <a:lstStyle/>
-            <a:p>
-              <a:pPr algn="ctr"/>
-              <a:r>
-                <a:rPr lang="en-US" dirty="0" smtClean="0"/>
-                <a:t>Vehicle</a:t>
-              </a:r>
-              <a:endParaRPr lang="en-US" dirty="0"/>
-            </a:p>
-          </p:txBody>
-        </p:sp>
-        <p:sp>
-          <p:nvSpPr>
-            <p:cNvPr id="14" name="Oval 13"/>
-            <p:cNvSpPr/>
-            <p:nvPr/>
-          </p:nvSpPr>
-          <p:spPr>
-            <a:xfrm>
-              <a:off x="10437255" y="4284130"/>
-              <a:ext cx="1275645" cy="1061156"/>
-            </a:xfrm>
-            <a:prstGeom prst="ellipse">
-              <a:avLst/>
-            </a:prstGeom>
-          </p:spPr>
-          <p:style>
-            <a:lnRef idx="2">
-              <a:schemeClr val="accent2">
-                <a:shade val="50000"/>
-              </a:schemeClr>
-            </a:lnRef>
-            <a:fillRef idx="1">
-              <a:schemeClr val="accent2"/>
-            </a:fillRef>
-            <a:effectRef idx="0">
-              <a:schemeClr val="accent2"/>
-            </a:effectRef>
-            <a:fontRef idx="minor">
-              <a:schemeClr val="lt1"/>
-            </a:fontRef>
-          </p:style>
-          <p:txBody>
-            <a:bodyPr rtlCol="0" anchor="ctr"/>
-            <a:lstStyle/>
-            <a:p>
-              <a:pPr algn="ctr"/>
-              <a:r>
-                <a:rPr lang="en-US" dirty="0" smtClean="0"/>
-                <a:t>Vehicle</a:t>
-              </a:r>
-              <a:endParaRPr lang="en-US" dirty="0"/>
-            </a:p>
-          </p:txBody>
-        </p:sp>
-      </p:grpSp>
-      <p:grpSp>
-        <p:nvGrpSpPr>
-          <p:cNvPr id="29" name="Group 28"/>
-          <p:cNvGrpSpPr/>
-          <p:nvPr/>
-        </p:nvGrpSpPr>
-        <p:grpSpPr>
-          <a:xfrm>
-            <a:off x="9012886" y="838364"/>
-            <a:ext cx="2698383" cy="2287411"/>
-            <a:chOff x="2303273" y="3870667"/>
-            <a:chExt cx="2698383" cy="2287411"/>
-          </a:xfrm>
-        </p:grpSpPr>
-        <p:sp>
-          <p:nvSpPr>
-            <p:cNvPr id="23" name="Rounded Rectangle 22"/>
-            <p:cNvSpPr/>
-            <p:nvPr/>
-          </p:nvSpPr>
-          <p:spPr>
-            <a:xfrm>
-              <a:off x="2303273" y="3870667"/>
-              <a:ext cx="2698383" cy="2287411"/>
-            </a:xfrm>
-            <a:prstGeom prst="roundRect">
-              <a:avLst/>
-            </a:prstGeom>
-          </p:spPr>
-          <p:style>
-            <a:lnRef idx="2">
-              <a:schemeClr val="accent1">
-                <a:shade val="50000"/>
-              </a:schemeClr>
-            </a:lnRef>
-            <a:fillRef idx="1">
-              <a:schemeClr val="accent1"/>
-            </a:fillRef>
-            <a:effectRef idx="0">
-              <a:schemeClr val="accent1"/>
-            </a:effectRef>
-            <a:fontRef idx="minor">
-              <a:schemeClr val="lt1"/>
-            </a:fontRef>
-          </p:style>
-          <p:txBody>
-            <a:bodyPr rtlCol="0" anchor="ctr"/>
-            <a:lstStyle/>
-            <a:p>
-              <a:pPr algn="ctr"/>
-              <a:endParaRPr lang="en-US"/>
-            </a:p>
-          </p:txBody>
-        </p:sp>
-        <p:sp>
-          <p:nvSpPr>
-            <p:cNvPr id="24" name="Rectangle 23"/>
-            <p:cNvSpPr/>
-            <p:nvPr/>
-          </p:nvSpPr>
-          <p:spPr>
-            <a:xfrm>
-              <a:off x="2633500" y="4105083"/>
-              <a:ext cx="919254" cy="578160"/>
-            </a:xfrm>
-            <a:prstGeom prst="rect">
-              <a:avLst/>
-            </a:prstGeom>
-          </p:spPr>
-          <p:style>
-            <a:lnRef idx="2">
-              <a:schemeClr val="accent6">
-                <a:shade val="50000"/>
-              </a:schemeClr>
-            </a:lnRef>
-            <a:fillRef idx="1">
-              <a:schemeClr val="accent6"/>
-            </a:fillRef>
-            <a:effectRef idx="0">
-              <a:schemeClr val="accent6"/>
-            </a:effectRef>
-            <a:fontRef idx="minor">
-              <a:schemeClr val="lt1"/>
-            </a:fontRef>
-          </p:style>
-          <p:txBody>
-            <a:bodyPr rtlCol="0" anchor="ctr"/>
-            <a:lstStyle/>
-            <a:p>
-              <a:pPr algn="ctr"/>
-              <a:r>
-                <a:rPr lang="en-US" dirty="0" smtClean="0"/>
-                <a:t>Vehicle</a:t>
-              </a:r>
-              <a:endParaRPr lang="en-US" dirty="0"/>
-            </a:p>
-          </p:txBody>
-        </p:sp>
-        <p:sp>
-          <p:nvSpPr>
-            <p:cNvPr id="25" name="Oval 24"/>
-            <p:cNvSpPr/>
-            <p:nvPr/>
-          </p:nvSpPr>
-          <p:spPr>
-            <a:xfrm>
-              <a:off x="2442096" y="4917659"/>
-              <a:ext cx="980442" cy="790503"/>
-            </a:xfrm>
-            <a:prstGeom prst="ellipse">
-              <a:avLst/>
-            </a:prstGeom>
-          </p:spPr>
-          <p:style>
-            <a:lnRef idx="2">
-              <a:schemeClr val="accent2">
-                <a:shade val="50000"/>
-              </a:schemeClr>
-            </a:lnRef>
-            <a:fillRef idx="1">
-              <a:schemeClr val="accent2"/>
-            </a:fillRef>
-            <a:effectRef idx="0">
-              <a:schemeClr val="accent2"/>
-            </a:effectRef>
-            <a:fontRef idx="minor">
-              <a:schemeClr val="lt1"/>
-            </a:fontRef>
-          </p:style>
-          <p:txBody>
-            <a:bodyPr rtlCol="0" anchor="ctr"/>
-            <a:lstStyle/>
-            <a:p>
-              <a:pPr algn="ctr"/>
-              <a:r>
-                <a:rPr lang="en-US" smtClean="0"/>
-                <a:t>Type</a:t>
-              </a:r>
-              <a:endParaRPr lang="en-US" dirty="0"/>
-            </a:p>
-          </p:txBody>
-        </p:sp>
-        <p:sp>
-          <p:nvSpPr>
-            <p:cNvPr id="27" name="Oval 26"/>
-            <p:cNvSpPr/>
-            <p:nvPr/>
-          </p:nvSpPr>
-          <p:spPr>
-            <a:xfrm>
-              <a:off x="3552754" y="4270035"/>
-              <a:ext cx="980921" cy="835129"/>
-            </a:xfrm>
-            <a:prstGeom prst="ellipse">
-              <a:avLst/>
-            </a:prstGeom>
-          </p:spPr>
-          <p:style>
-            <a:lnRef idx="2">
-              <a:schemeClr val="accent2">
-                <a:shade val="50000"/>
-              </a:schemeClr>
-            </a:lnRef>
-            <a:fillRef idx="1">
-              <a:schemeClr val="accent2"/>
-            </a:fillRef>
-            <a:effectRef idx="0">
-              <a:schemeClr val="accent2"/>
-            </a:effectRef>
-            <a:fontRef idx="minor">
-              <a:schemeClr val="lt1"/>
-            </a:fontRef>
-          </p:style>
-          <p:txBody>
-            <a:bodyPr rtlCol="0" anchor="ctr"/>
-            <a:lstStyle/>
-            <a:p>
-              <a:pPr algn="ctr"/>
-              <a:r>
-                <a:rPr lang="en-US" dirty="0" smtClean="0"/>
-                <a:t>State</a:t>
-              </a:r>
-              <a:endParaRPr lang="en-US" dirty="0"/>
-            </a:p>
-          </p:txBody>
-        </p:sp>
-      </p:grpSp>
-      <p:grpSp>
-        <p:nvGrpSpPr>
           <p:cNvPr id="31" name="Group 30"/>
           <p:cNvGrpSpPr/>
           <p:nvPr/>
         </p:nvGrpSpPr>
         <p:grpSpPr>
           <a:xfrm>
-            <a:off x="872604" y="268275"/>
+            <a:off x="1033968" y="281722"/>
             <a:ext cx="5022144" cy="3070578"/>
             <a:chOff x="512940" y="670066"/>
             <a:chExt cx="5022144" cy="3070578"/>
@@ -3561,19 +3005,17 @@
             </a:prstGeom>
           </p:spPr>
           <p:style>
-            <a:lnRef idx="2">
-              <a:schemeClr val="accent1">
-                <a:shade val="50000"/>
-              </a:schemeClr>
+            <a:lnRef idx="1">
+              <a:schemeClr val="accent6"/>
             </a:lnRef>
-            <a:fillRef idx="1">
-              <a:schemeClr val="accent1"/>
+            <a:fillRef idx="2">
+              <a:schemeClr val="accent6"/>
             </a:fillRef>
-            <a:effectRef idx="0">
-              <a:schemeClr val="accent1"/>
+            <a:effectRef idx="1">
+              <a:schemeClr val="accent6"/>
             </a:effectRef>
             <a:fontRef idx="minor">
-              <a:schemeClr val="lt1"/>
+              <a:schemeClr val="dk1"/>
             </a:fontRef>
           </p:style>
           <p:txBody>
@@ -3848,47 +3290,45 @@
       </p:sp>
       <p:grpSp>
         <p:nvGrpSpPr>
-          <p:cNvPr id="26" name="Group 25"/>
+          <p:cNvPr id="20" name="Group 19"/>
           <p:cNvGrpSpPr/>
           <p:nvPr/>
         </p:nvGrpSpPr>
         <p:grpSpPr>
           <a:xfrm>
-            <a:off x="9012885" y="3722851"/>
-            <a:ext cx="2698383" cy="2287411"/>
-            <a:chOff x="2303273" y="3870667"/>
-            <a:chExt cx="2698383" cy="2287411"/>
+            <a:off x="216414" y="3520802"/>
+            <a:ext cx="3510844" cy="3070578"/>
+            <a:chOff x="216414" y="3520802"/>
+            <a:chExt cx="3510844" cy="3070578"/>
           </a:xfrm>
         </p:grpSpPr>
         <p:sp>
           <p:nvSpPr>
-            <p:cNvPr id="28" name="Rounded Rectangle 27"/>
+            <p:cNvPr id="7" name="Rounded Rectangle 6"/>
             <p:cNvSpPr/>
             <p:nvPr/>
           </p:nvSpPr>
           <p:spPr>
             <a:xfrm>
-              <a:off x="2303273" y="3870667"/>
-              <a:ext cx="2698383" cy="2287411"/>
+              <a:off x="216414" y="3520802"/>
+              <a:ext cx="3510844" cy="3070578"/>
             </a:xfrm>
             <a:prstGeom prst="roundRect">
               <a:avLst/>
             </a:prstGeom>
           </p:spPr>
           <p:style>
-            <a:lnRef idx="2">
-              <a:schemeClr val="accent1">
-                <a:shade val="50000"/>
-              </a:schemeClr>
+            <a:lnRef idx="1">
+              <a:schemeClr val="accent2"/>
             </a:lnRef>
-            <a:fillRef idx="1">
-              <a:schemeClr val="accent1"/>
+            <a:fillRef idx="2">
+              <a:schemeClr val="accent2"/>
             </a:fillRef>
-            <a:effectRef idx="0">
-              <a:schemeClr val="accent1"/>
+            <a:effectRef idx="1">
+              <a:schemeClr val="accent2"/>
             </a:effectRef>
             <a:fontRef idx="minor">
-              <a:schemeClr val="lt1"/>
+              <a:schemeClr val="dk1"/>
             </a:fontRef>
           </p:style>
           <p:txBody>
@@ -3902,102 +3342,14 @@
         </p:sp>
         <p:sp>
           <p:nvSpPr>
-            <p:cNvPr id="32" name="Rectangle 31"/>
+            <p:cNvPr id="8" name="Oval 7"/>
             <p:cNvSpPr/>
             <p:nvPr/>
           </p:nvSpPr>
           <p:spPr>
             <a:xfrm>
-              <a:off x="2633500" y="4105083"/>
-              <a:ext cx="919254" cy="578160"/>
-            </a:xfrm>
-            <a:prstGeom prst="rect">
-              <a:avLst/>
-            </a:prstGeom>
-          </p:spPr>
-          <p:style>
-            <a:lnRef idx="2">
-              <a:schemeClr val="accent6">
-                <a:shade val="50000"/>
-              </a:schemeClr>
-            </a:lnRef>
-            <a:fillRef idx="1">
-              <a:schemeClr val="accent6"/>
-            </a:fillRef>
-            <a:effectRef idx="0">
-              <a:schemeClr val="accent6"/>
-            </a:effectRef>
-            <a:fontRef idx="minor">
-              <a:schemeClr val="lt1"/>
-            </a:fontRef>
-          </p:style>
-          <p:txBody>
-            <a:bodyPr rtlCol="0" anchor="ctr"/>
-            <a:lstStyle/>
-            <a:p>
-              <a:pPr algn="ctr"/>
-              <a:r>
-                <a:rPr lang="en-US" dirty="0" smtClean="0"/>
-                <a:t>Vehicle</a:t>
-              </a:r>
-              <a:endParaRPr lang="en-US" dirty="0"/>
-            </a:p>
-          </p:txBody>
-        </p:sp>
-        <p:sp>
-          <p:nvSpPr>
-            <p:cNvPr id="33" name="Oval 32"/>
-            <p:cNvSpPr/>
-            <p:nvPr/>
-          </p:nvSpPr>
-          <p:spPr>
-            <a:xfrm>
-              <a:off x="2442096" y="4917659"/>
-              <a:ext cx="980442" cy="790503"/>
-            </a:xfrm>
-            <a:prstGeom prst="ellipse">
-              <a:avLst/>
-            </a:prstGeom>
-          </p:spPr>
-          <p:style>
-            <a:lnRef idx="2">
-              <a:schemeClr val="accent2">
-                <a:shade val="50000"/>
-              </a:schemeClr>
-            </a:lnRef>
-            <a:fillRef idx="1">
-              <a:schemeClr val="accent2"/>
-            </a:fillRef>
-            <a:effectRef idx="0">
-              <a:schemeClr val="accent2"/>
-            </a:effectRef>
-            <a:fontRef idx="minor">
-              <a:schemeClr val="lt1"/>
-            </a:fontRef>
-          </p:style>
-          <p:txBody>
-            <a:bodyPr rtlCol="0" anchor="ctr"/>
-            <a:lstStyle/>
-            <a:p>
-              <a:pPr algn="ctr"/>
-              <a:r>
-                <a:rPr lang="en-US" smtClean="0"/>
-                <a:t>Type</a:t>
-              </a:r>
-              <a:endParaRPr lang="en-US" dirty="0"/>
-            </a:p>
-          </p:txBody>
-        </p:sp>
-        <p:sp>
-          <p:nvSpPr>
-            <p:cNvPr id="34" name="Oval 33"/>
-            <p:cNvSpPr/>
-            <p:nvPr/>
-          </p:nvSpPr>
-          <p:spPr>
-            <a:xfrm>
-              <a:off x="3552754" y="4270035"/>
-              <a:ext cx="980921" cy="835129"/>
+              <a:off x="397036" y="3835478"/>
+              <a:ext cx="1574799" cy="776111"/>
             </a:xfrm>
             <a:prstGeom prst="ellipse">
               <a:avLst/>
@@ -4026,7 +3378,650 @@
               <a:pPr algn="ctr"/>
               <a:r>
                 <a:rPr lang="en-US" dirty="0" smtClean="0"/>
+                <a:t>Highway</a:t>
+              </a:r>
+              <a:endParaRPr lang="en-US" dirty="0"/>
+            </a:p>
+          </p:txBody>
+        </p:sp>
+        <p:sp>
+          <p:nvSpPr>
+            <p:cNvPr id="13" name="Hexagon 12"/>
+            <p:cNvSpPr/>
+            <p:nvPr/>
+          </p:nvSpPr>
+          <p:spPr>
+            <a:xfrm>
+              <a:off x="1971836" y="3994935"/>
+              <a:ext cx="1586767" cy="1061156"/>
+            </a:xfrm>
+            <a:prstGeom prst="hexagon">
+              <a:avLst/>
+            </a:prstGeom>
+          </p:spPr>
+          <p:style>
+            <a:lnRef idx="2">
+              <a:schemeClr val="accent4">
+                <a:shade val="50000"/>
+              </a:schemeClr>
+            </a:lnRef>
+            <a:fillRef idx="1">
+              <a:schemeClr val="accent4"/>
+            </a:fillRef>
+            <a:effectRef idx="0">
+              <a:schemeClr val="accent4"/>
+            </a:effectRef>
+            <a:fontRef idx="minor">
+              <a:schemeClr val="lt1"/>
+            </a:fontRef>
+          </p:style>
+          <p:txBody>
+            <a:bodyPr rtlCol="0" anchor="ctr"/>
+            <a:lstStyle/>
+            <a:p>
+              <a:pPr algn="ctr"/>
+              <a:r>
+                <a:rPr lang="en-US" smtClean="0"/>
+                <a:t>Platoon</a:t>
+              </a:r>
+              <a:endParaRPr lang="en-US" dirty="0"/>
+            </a:p>
+          </p:txBody>
+        </p:sp>
+        <p:sp>
+          <p:nvSpPr>
+            <p:cNvPr id="36" name="Hexagon 35"/>
+            <p:cNvSpPr/>
+            <p:nvPr/>
+          </p:nvSpPr>
+          <p:spPr>
+            <a:xfrm>
+              <a:off x="534363" y="5112616"/>
+              <a:ext cx="1586767" cy="1061156"/>
+            </a:xfrm>
+            <a:prstGeom prst="hexagon">
+              <a:avLst/>
+            </a:prstGeom>
+          </p:spPr>
+          <p:style>
+            <a:lnRef idx="2">
+              <a:schemeClr val="accent4">
+                <a:shade val="50000"/>
+              </a:schemeClr>
+            </a:lnRef>
+            <a:fillRef idx="1">
+              <a:schemeClr val="accent4"/>
+            </a:fillRef>
+            <a:effectRef idx="0">
+              <a:schemeClr val="accent4"/>
+            </a:effectRef>
+            <a:fontRef idx="minor">
+              <a:schemeClr val="lt1"/>
+            </a:fontRef>
+          </p:style>
+          <p:txBody>
+            <a:bodyPr rtlCol="0" anchor="ctr"/>
+            <a:lstStyle/>
+            <a:p>
+              <a:pPr algn="ctr"/>
+              <a:r>
+                <a:rPr lang="en-US" smtClean="0"/>
+                <a:t>Platoon</a:t>
+              </a:r>
+              <a:endParaRPr lang="en-US" dirty="0"/>
+            </a:p>
+          </p:txBody>
+        </p:sp>
+      </p:grpSp>
+      <p:grpSp>
+        <p:nvGrpSpPr>
+          <p:cNvPr id="21" name="Group 20"/>
+          <p:cNvGrpSpPr/>
+          <p:nvPr/>
+        </p:nvGrpSpPr>
+        <p:grpSpPr>
+          <a:xfrm>
+            <a:off x="3857474" y="3561143"/>
+            <a:ext cx="3510844" cy="3070578"/>
+            <a:chOff x="3857474" y="3547696"/>
+            <a:chExt cx="3510844" cy="3070578"/>
+          </a:xfrm>
+        </p:grpSpPr>
+        <p:sp>
+          <p:nvSpPr>
+            <p:cNvPr id="10" name="Rounded Rectangle 9"/>
+            <p:cNvSpPr/>
+            <p:nvPr/>
+          </p:nvSpPr>
+          <p:spPr>
+            <a:xfrm>
+              <a:off x="3857474" y="3547696"/>
+              <a:ext cx="3510844" cy="3070578"/>
+            </a:xfrm>
+            <a:prstGeom prst="roundRect">
+              <a:avLst/>
+            </a:prstGeom>
+          </p:spPr>
+          <p:style>
+            <a:lnRef idx="1">
+              <a:schemeClr val="accent4"/>
+            </a:lnRef>
+            <a:fillRef idx="2">
+              <a:schemeClr val="accent4"/>
+            </a:fillRef>
+            <a:effectRef idx="1">
+              <a:schemeClr val="accent4"/>
+            </a:effectRef>
+            <a:fontRef idx="minor">
+              <a:schemeClr val="dk1"/>
+            </a:fontRef>
+          </p:style>
+          <p:txBody>
+            <a:bodyPr rtlCol="0" anchor="ctr"/>
+            <a:lstStyle/>
+            <a:p>
+              <a:pPr algn="ctr"/>
+              <a:endParaRPr lang="en-US"/>
+            </a:p>
+          </p:txBody>
+        </p:sp>
+        <p:sp>
+          <p:nvSpPr>
+            <p:cNvPr id="12" name="Pentagon 11"/>
+            <p:cNvSpPr/>
+            <p:nvPr/>
+          </p:nvSpPr>
+          <p:spPr>
+            <a:xfrm>
+              <a:off x="4038096" y="5459505"/>
+              <a:ext cx="1152469" cy="554809"/>
+            </a:xfrm>
+            <a:prstGeom prst="homePlate">
+              <a:avLst/>
+            </a:prstGeom>
+          </p:spPr>
+          <p:style>
+            <a:lnRef idx="2">
+              <a:schemeClr val="accent1">
+                <a:shade val="50000"/>
+              </a:schemeClr>
+            </a:lnRef>
+            <a:fillRef idx="1">
+              <a:schemeClr val="accent1"/>
+            </a:fillRef>
+            <a:effectRef idx="0">
+              <a:schemeClr val="accent1"/>
+            </a:effectRef>
+            <a:fontRef idx="minor">
+              <a:schemeClr val="lt1"/>
+            </a:fontRef>
+          </p:style>
+          <p:txBody>
+            <a:bodyPr rtlCol="0" anchor="ctr"/>
+            <a:lstStyle/>
+            <a:p>
+              <a:pPr algn="ctr"/>
+              <a:r>
+                <a:rPr lang="en-US" smtClean="0"/>
+                <a:t>vehicle</a:t>
+              </a:r>
+              <a:endParaRPr lang="en-US" dirty="0"/>
+            </a:p>
+          </p:txBody>
+        </p:sp>
+        <p:sp>
+          <p:nvSpPr>
+            <p:cNvPr id="37" name="Hexagon 36"/>
+            <p:cNvSpPr/>
+            <p:nvPr/>
+          </p:nvSpPr>
+          <p:spPr>
+            <a:xfrm>
+              <a:off x="4026129" y="3722749"/>
+              <a:ext cx="1586767" cy="1061156"/>
+            </a:xfrm>
+            <a:prstGeom prst="hexagon">
+              <a:avLst/>
+            </a:prstGeom>
+          </p:spPr>
+          <p:style>
+            <a:lnRef idx="2">
+              <a:schemeClr val="accent4">
+                <a:shade val="50000"/>
+              </a:schemeClr>
+            </a:lnRef>
+            <a:fillRef idx="1">
+              <a:schemeClr val="accent4"/>
+            </a:fillRef>
+            <a:effectRef idx="0">
+              <a:schemeClr val="accent4"/>
+            </a:effectRef>
+            <a:fontRef idx="minor">
+              <a:schemeClr val="lt1"/>
+            </a:fontRef>
+          </p:style>
+          <p:txBody>
+            <a:bodyPr rtlCol="0" anchor="ctr"/>
+            <a:lstStyle/>
+            <a:p>
+              <a:pPr algn="ctr"/>
+              <a:r>
+                <a:rPr lang="en-US" smtClean="0"/>
+                <a:t>Platoon</a:t>
+              </a:r>
+              <a:endParaRPr lang="en-US" dirty="0"/>
+            </a:p>
+          </p:txBody>
+        </p:sp>
+        <p:sp>
+          <p:nvSpPr>
+            <p:cNvPr id="38" name="Pentagon 37"/>
+            <p:cNvSpPr/>
+            <p:nvPr/>
+          </p:nvSpPr>
+          <p:spPr>
+            <a:xfrm>
+              <a:off x="5873605" y="4835211"/>
+              <a:ext cx="1152469" cy="554809"/>
+            </a:xfrm>
+            <a:prstGeom prst="homePlate">
+              <a:avLst/>
+            </a:prstGeom>
+          </p:spPr>
+          <p:style>
+            <a:lnRef idx="2">
+              <a:schemeClr val="accent1">
+                <a:shade val="50000"/>
+              </a:schemeClr>
+            </a:lnRef>
+            <a:fillRef idx="1">
+              <a:schemeClr val="accent1"/>
+            </a:fillRef>
+            <a:effectRef idx="0">
+              <a:schemeClr val="accent1"/>
+            </a:effectRef>
+            <a:fontRef idx="minor">
+              <a:schemeClr val="lt1"/>
+            </a:fontRef>
+          </p:style>
+          <p:txBody>
+            <a:bodyPr rtlCol="0" anchor="ctr"/>
+            <a:lstStyle/>
+            <a:p>
+              <a:pPr algn="ctr"/>
+              <a:r>
+                <a:rPr lang="en-US" smtClean="0"/>
+                <a:t>vehicle</a:t>
+              </a:r>
+              <a:endParaRPr lang="en-US" dirty="0"/>
+            </a:p>
+          </p:txBody>
+        </p:sp>
+      </p:grpSp>
+      <p:grpSp>
+        <p:nvGrpSpPr>
+          <p:cNvPr id="19" name="Group 18"/>
+          <p:cNvGrpSpPr/>
+          <p:nvPr/>
+        </p:nvGrpSpPr>
+        <p:grpSpPr>
+          <a:xfrm>
+            <a:off x="8782958" y="908926"/>
+            <a:ext cx="2698383" cy="2287411"/>
+            <a:chOff x="8782958" y="908926"/>
+            <a:chExt cx="2698383" cy="2287411"/>
+          </a:xfrm>
+        </p:grpSpPr>
+        <p:sp>
+          <p:nvSpPr>
+            <p:cNvPr id="23" name="Rounded Rectangle 22"/>
+            <p:cNvSpPr/>
+            <p:nvPr/>
+          </p:nvSpPr>
+          <p:spPr>
+            <a:xfrm>
+              <a:off x="8782958" y="908926"/>
+              <a:ext cx="2698383" cy="2287411"/>
+            </a:xfrm>
+            <a:prstGeom prst="roundRect">
+              <a:avLst/>
+            </a:prstGeom>
+          </p:spPr>
+          <p:style>
+            <a:lnRef idx="1">
+              <a:schemeClr val="accent1"/>
+            </a:lnRef>
+            <a:fillRef idx="2">
+              <a:schemeClr val="accent1"/>
+            </a:fillRef>
+            <a:effectRef idx="1">
+              <a:schemeClr val="accent1"/>
+            </a:effectRef>
+            <a:fontRef idx="minor">
+              <a:schemeClr val="dk1"/>
+            </a:fontRef>
+          </p:style>
+          <p:txBody>
+            <a:bodyPr rtlCol="0" anchor="ctr"/>
+            <a:lstStyle/>
+            <a:p>
+              <a:pPr algn="ctr"/>
+              <a:endParaRPr lang="en-US"/>
+            </a:p>
+          </p:txBody>
+        </p:sp>
+        <p:sp>
+          <p:nvSpPr>
+            <p:cNvPr id="27" name="Diamond 26"/>
+            <p:cNvSpPr/>
+            <p:nvPr/>
+          </p:nvSpPr>
+          <p:spPr>
+            <a:xfrm>
+              <a:off x="10044722" y="1528452"/>
+              <a:ext cx="1388304" cy="776000"/>
+            </a:xfrm>
+            <a:prstGeom prst="diamond">
+              <a:avLst/>
+            </a:prstGeom>
+          </p:spPr>
+          <p:style>
+            <a:lnRef idx="2">
+              <a:schemeClr val="accent3">
+                <a:shade val="50000"/>
+              </a:schemeClr>
+            </a:lnRef>
+            <a:fillRef idx="1">
+              <a:schemeClr val="accent3"/>
+            </a:fillRef>
+            <a:effectRef idx="0">
+              <a:schemeClr val="accent3"/>
+            </a:effectRef>
+            <a:fontRef idx="minor">
+              <a:schemeClr val="lt1"/>
+            </a:fontRef>
+          </p:style>
+          <p:txBody>
+            <a:bodyPr rtlCol="0" anchor="ctr"/>
+            <a:lstStyle/>
+            <a:p>
+              <a:pPr algn="ctr"/>
+              <a:r>
+                <a:rPr lang="en-US" dirty="0" smtClean="0"/>
                 <a:t>State</a:t>
+              </a:r>
+              <a:endParaRPr lang="en-US" dirty="0"/>
+            </a:p>
+          </p:txBody>
+        </p:sp>
+        <p:sp>
+          <p:nvSpPr>
+            <p:cNvPr id="39" name="Pentagon 38"/>
+            <p:cNvSpPr/>
+            <p:nvPr/>
+          </p:nvSpPr>
+          <p:spPr>
+            <a:xfrm>
+              <a:off x="9167415" y="1158035"/>
+              <a:ext cx="1152469" cy="554809"/>
+            </a:xfrm>
+            <a:prstGeom prst="homePlate">
+              <a:avLst/>
+            </a:prstGeom>
+          </p:spPr>
+          <p:style>
+            <a:lnRef idx="2">
+              <a:schemeClr val="accent1">
+                <a:shade val="50000"/>
+              </a:schemeClr>
+            </a:lnRef>
+            <a:fillRef idx="1">
+              <a:schemeClr val="accent1"/>
+            </a:fillRef>
+            <a:effectRef idx="0">
+              <a:schemeClr val="accent1"/>
+            </a:effectRef>
+            <a:fontRef idx="minor">
+              <a:schemeClr val="lt1"/>
+            </a:fontRef>
+          </p:style>
+          <p:txBody>
+            <a:bodyPr rtlCol="0" anchor="ctr"/>
+            <a:lstStyle/>
+            <a:p>
+              <a:pPr algn="ctr"/>
+              <a:r>
+                <a:rPr lang="en-US" smtClean="0"/>
+                <a:t>vehicle</a:t>
+              </a:r>
+              <a:endParaRPr lang="en-US" dirty="0"/>
+            </a:p>
+          </p:txBody>
+        </p:sp>
+        <p:sp>
+          <p:nvSpPr>
+            <p:cNvPr id="40" name="Diamond 39"/>
+            <p:cNvSpPr/>
+            <p:nvPr/>
+          </p:nvSpPr>
+          <p:spPr>
+            <a:xfrm>
+              <a:off x="9033216" y="2016039"/>
+              <a:ext cx="1388304" cy="776000"/>
+            </a:xfrm>
+            <a:prstGeom prst="diamond">
+              <a:avLst/>
+            </a:prstGeom>
+          </p:spPr>
+          <p:style>
+            <a:lnRef idx="2">
+              <a:schemeClr val="accent3">
+                <a:shade val="50000"/>
+              </a:schemeClr>
+            </a:lnRef>
+            <a:fillRef idx="1">
+              <a:schemeClr val="accent3"/>
+            </a:fillRef>
+            <a:effectRef idx="0">
+              <a:schemeClr val="accent3"/>
+            </a:effectRef>
+            <a:fontRef idx="minor">
+              <a:schemeClr val="lt1"/>
+            </a:fontRef>
+          </p:style>
+          <p:txBody>
+            <a:bodyPr rtlCol="0" anchor="ctr"/>
+            <a:lstStyle/>
+            <a:p>
+              <a:pPr algn="ctr"/>
+              <a:r>
+                <a:rPr lang="en-US" dirty="0" smtClean="0"/>
+                <a:t>Type</a:t>
+              </a:r>
+              <a:endParaRPr lang="en-US" dirty="0"/>
+            </a:p>
+          </p:txBody>
+        </p:sp>
+      </p:grpSp>
+      <p:grpSp>
+        <p:nvGrpSpPr>
+          <p:cNvPr id="41" name="Group 40"/>
+          <p:cNvGrpSpPr/>
+          <p:nvPr/>
+        </p:nvGrpSpPr>
+        <p:grpSpPr>
+          <a:xfrm>
+            <a:off x="8695530" y="3942015"/>
+            <a:ext cx="2698383" cy="2287411"/>
+            <a:chOff x="8782958" y="908926"/>
+            <a:chExt cx="2698383" cy="2287411"/>
+          </a:xfrm>
+        </p:grpSpPr>
+        <p:sp>
+          <p:nvSpPr>
+            <p:cNvPr id="42" name="Rounded Rectangle 41"/>
+            <p:cNvSpPr/>
+            <p:nvPr/>
+          </p:nvSpPr>
+          <p:spPr>
+            <a:xfrm>
+              <a:off x="8782958" y="908926"/>
+              <a:ext cx="2698383" cy="2287411"/>
+            </a:xfrm>
+            <a:prstGeom prst="roundRect">
+              <a:avLst/>
+            </a:prstGeom>
+          </p:spPr>
+          <p:style>
+            <a:lnRef idx="1">
+              <a:schemeClr val="accent1"/>
+            </a:lnRef>
+            <a:fillRef idx="2">
+              <a:schemeClr val="accent1"/>
+            </a:fillRef>
+            <a:effectRef idx="1">
+              <a:schemeClr val="accent1"/>
+            </a:effectRef>
+            <a:fontRef idx="minor">
+              <a:schemeClr val="dk1"/>
+            </a:fontRef>
+          </p:style>
+          <p:txBody>
+            <a:bodyPr rtlCol="0" anchor="ctr"/>
+            <a:lstStyle/>
+            <a:p>
+              <a:pPr algn="ctr"/>
+              <a:endParaRPr lang="en-US"/>
+            </a:p>
+          </p:txBody>
+        </p:sp>
+        <p:sp>
+          <p:nvSpPr>
+            <p:cNvPr id="43" name="Diamond 42"/>
+            <p:cNvSpPr/>
+            <p:nvPr/>
+          </p:nvSpPr>
+          <p:spPr>
+            <a:xfrm>
+              <a:off x="10044722" y="1528452"/>
+              <a:ext cx="1388304" cy="776000"/>
+            </a:xfrm>
+            <a:prstGeom prst="diamond">
+              <a:avLst/>
+            </a:prstGeom>
+          </p:spPr>
+          <p:style>
+            <a:lnRef idx="2">
+              <a:schemeClr val="accent3">
+                <a:shade val="50000"/>
+              </a:schemeClr>
+            </a:lnRef>
+            <a:fillRef idx="1">
+              <a:schemeClr val="accent3"/>
+            </a:fillRef>
+            <a:effectRef idx="0">
+              <a:schemeClr val="accent3"/>
+            </a:effectRef>
+            <a:fontRef idx="minor">
+              <a:schemeClr val="lt1"/>
+            </a:fontRef>
+          </p:style>
+          <p:txBody>
+            <a:bodyPr rtlCol="0" anchor="ctr"/>
+            <a:lstStyle/>
+            <a:p>
+              <a:pPr algn="ctr"/>
+              <a:r>
+                <a:rPr lang="en-US" dirty="0" smtClean="0"/>
+                <a:t>State</a:t>
+              </a:r>
+              <a:endParaRPr lang="en-US" dirty="0"/>
+            </a:p>
+          </p:txBody>
+        </p:sp>
+        <p:sp>
+          <p:nvSpPr>
+            <p:cNvPr id="44" name="Pentagon 43"/>
+            <p:cNvSpPr/>
+            <p:nvPr/>
+          </p:nvSpPr>
+          <p:spPr>
+            <a:xfrm>
+              <a:off x="9167415" y="1158035"/>
+              <a:ext cx="1152469" cy="554809"/>
+            </a:xfrm>
+            <a:prstGeom prst="homePlate">
+              <a:avLst/>
+            </a:prstGeom>
+          </p:spPr>
+          <p:style>
+            <a:lnRef idx="2">
+              <a:schemeClr val="accent1">
+                <a:shade val="50000"/>
+              </a:schemeClr>
+            </a:lnRef>
+            <a:fillRef idx="1">
+              <a:schemeClr val="accent1"/>
+            </a:fillRef>
+            <a:effectRef idx="0">
+              <a:schemeClr val="accent1"/>
+            </a:effectRef>
+            <a:fontRef idx="minor">
+              <a:schemeClr val="lt1"/>
+            </a:fontRef>
+          </p:style>
+          <p:txBody>
+            <a:bodyPr rtlCol="0" anchor="ctr"/>
+            <a:lstStyle/>
+            <a:p>
+              <a:pPr algn="ctr"/>
+              <a:r>
+                <a:rPr lang="en-US" smtClean="0"/>
+                <a:t>vehicle</a:t>
+              </a:r>
+              <a:endParaRPr lang="en-US" dirty="0"/>
+            </a:p>
+          </p:txBody>
+        </p:sp>
+        <p:sp>
+          <p:nvSpPr>
+            <p:cNvPr id="45" name="Diamond 44"/>
+            <p:cNvSpPr/>
+            <p:nvPr/>
+          </p:nvSpPr>
+          <p:spPr>
+            <a:xfrm>
+              <a:off x="9033216" y="2016039"/>
+              <a:ext cx="1388304" cy="776000"/>
+            </a:xfrm>
+            <a:prstGeom prst="diamond">
+              <a:avLst/>
+            </a:prstGeom>
+          </p:spPr>
+          <p:style>
+            <a:lnRef idx="2">
+              <a:schemeClr val="accent3">
+                <a:shade val="50000"/>
+              </a:schemeClr>
+            </a:lnRef>
+            <a:fillRef idx="1">
+              <a:schemeClr val="accent3"/>
+            </a:fillRef>
+            <a:effectRef idx="0">
+              <a:schemeClr val="accent3"/>
+            </a:effectRef>
+            <a:fontRef idx="minor">
+              <a:schemeClr val="lt1"/>
+            </a:fontRef>
+          </p:style>
+          <p:txBody>
+            <a:bodyPr rtlCol="0" anchor="ctr"/>
+            <a:lstStyle/>
+            <a:p>
+              <a:pPr algn="ctr"/>
+              <a:r>
+                <a:rPr lang="en-US" dirty="0" smtClean="0"/>
+                <a:t>Type</a:t>
               </a:r>
               <a:endParaRPr lang="en-US" dirty="0"/>
             </a:p>
@@ -4078,7 +4073,7 @@
         </p:nvSpPr>
         <p:spPr>
           <a:xfrm>
-            <a:off x="801512" y="333024"/>
+            <a:off x="1422018" y="1144627"/>
             <a:ext cx="1286933" cy="846665"/>
           </a:xfrm>
           <a:prstGeom prst="rect">
@@ -4087,15 +4082,15 @@
         </p:spPr>
         <p:style>
           <a:lnRef idx="2">
-            <a:schemeClr val="accent1">
+            <a:schemeClr val="accent6">
               <a:shade val="50000"/>
             </a:schemeClr>
           </a:lnRef>
           <a:fillRef idx="1">
-            <a:schemeClr val="accent1"/>
+            <a:schemeClr val="accent6"/>
           </a:fillRef>
           <a:effectRef idx="0">
-            <a:schemeClr val="accent1"/>
+            <a:schemeClr val="accent6"/>
           </a:effectRef>
           <a:fontRef idx="minor">
             <a:schemeClr val="lt1"/>
@@ -4122,7 +4117,7 @@
         </p:nvGrpSpPr>
         <p:grpSpPr>
           <a:xfrm>
-            <a:off x="3371425" y="0"/>
+            <a:off x="4908598" y="134272"/>
             <a:ext cx="6699167" cy="2425156"/>
             <a:chOff x="5492833" y="352483"/>
             <a:chExt cx="6699167" cy="2425156"/>
@@ -4400,7 +4395,7 @@
         </p:nvGrpSpPr>
         <p:grpSpPr>
           <a:xfrm>
-            <a:off x="3566000" y="2529738"/>
+            <a:off x="5133075" y="2672103"/>
             <a:ext cx="6504592" cy="2518886"/>
             <a:chOff x="5813774" y="3292084"/>
             <a:chExt cx="6504592" cy="2518886"/>
@@ -4678,7 +4673,7 @@
         </p:nvGrpSpPr>
         <p:grpSpPr>
           <a:xfrm>
-            <a:off x="456759" y="4186106"/>
+            <a:off x="140732" y="4307955"/>
             <a:ext cx="6507250" cy="2432755"/>
             <a:chOff x="81855" y="4294064"/>
             <a:chExt cx="6507250" cy="2432755"/>
@@ -4921,6 +4916,1814 @@
       </p:par>
     </p:tnLst>
   </p:timing>
+</p:sld>
+</file>
+
+<file path=ppt/slides/slide3.xml><?xml version="1.0" encoding="utf-8"?>
+<p:sld xmlns:a="http://schemas.openxmlformats.org/drawingml/2006/main" xmlns:r="http://schemas.openxmlformats.org/officeDocument/2006/relationships" xmlns:p="http://schemas.openxmlformats.org/presentationml/2006/main">
+  <p:cSld>
+    <p:spTree>
+      <p:nvGrpSpPr>
+        <p:cNvPr id="1" name=""/>
+        <p:cNvGrpSpPr/>
+        <p:nvPr/>
+      </p:nvGrpSpPr>
+      <p:grpSpPr>
+        <a:xfrm>
+          <a:off x="0" y="0"/>
+          <a:ext cx="0" cy="0"/>
+          <a:chOff x="0" y="0"/>
+          <a:chExt cx="0" cy="0"/>
+        </a:xfrm>
+      </p:grpSpPr>
+      <p:sp>
+        <p:nvSpPr>
+          <p:cNvPr id="2" name="Title 1"/>
+          <p:cNvSpPr>
+            <a:spLocks noGrp="1"/>
+          </p:cNvSpPr>
+          <p:nvPr>
+            <p:ph type="title"/>
+          </p:nvPr>
+        </p:nvSpPr>
+        <p:spPr/>
+        <p:txBody>
+          <a:bodyPr/>
+          <a:lstStyle/>
+          <a:p>
+            <a:r>
+              <a:rPr lang="en-US" dirty="0" smtClean="0"/>
+              <a:t>Vehicle responsibilities</a:t>
+            </a:r>
+            <a:endParaRPr lang="en-US" dirty="0"/>
+          </a:p>
+        </p:txBody>
+      </p:sp>
+      <p:sp>
+        <p:nvSpPr>
+          <p:cNvPr id="3" name="Content Placeholder 2"/>
+          <p:cNvSpPr>
+            <a:spLocks noGrp="1"/>
+          </p:cNvSpPr>
+          <p:nvPr>
+            <p:ph idx="1"/>
+          </p:nvPr>
+        </p:nvSpPr>
+        <p:spPr/>
+        <p:txBody>
+          <a:bodyPr>
+            <a:normAutofit/>
+          </a:bodyPr>
+          <a:lstStyle/>
+          <a:p>
+            <a:r>
+              <a:rPr lang="en-US" dirty="0" smtClean="0"/>
+              <a:t>Each vehicle registers itself with TFM before it flies</a:t>
+            </a:r>
+          </a:p>
+          <a:p>
+            <a:pPr lvl="1"/>
+            <a:r>
+              <a:rPr lang="en-US" dirty="0" smtClean="0"/>
+              <a:t>Deregisters when vehicle gets to destination</a:t>
+            </a:r>
+          </a:p>
+          <a:p>
+            <a:r>
+              <a:rPr lang="en-US" dirty="0" smtClean="0"/>
+              <a:t>Each vehicle </a:t>
+            </a:r>
+            <a:r>
+              <a:rPr lang="en-US" dirty="0" err="1" smtClean="0"/>
+              <a:t>reigsters</a:t>
+            </a:r>
+            <a:r>
+              <a:rPr lang="en-US" dirty="0" smtClean="0"/>
+              <a:t> platoon with TFM when it forms a platoon</a:t>
+            </a:r>
+          </a:p>
+          <a:p>
+            <a:pPr lvl="1"/>
+            <a:r>
+              <a:rPr lang="en-US" dirty="0" smtClean="0"/>
+              <a:t>Deregisters when platoon is dissolved</a:t>
+            </a:r>
+          </a:p>
+        </p:txBody>
+      </p:sp>
+      <p:sp>
+        <p:nvSpPr>
+          <p:cNvPr id="4" name="Rectangle 3"/>
+          <p:cNvSpPr/>
+          <p:nvPr/>
+        </p:nvSpPr>
+        <p:spPr>
+          <a:xfrm>
+            <a:off x="1506071" y="4424082"/>
+            <a:ext cx="1506071" cy="927847"/>
+          </a:xfrm>
+          <a:prstGeom prst="rect">
+            <a:avLst/>
+          </a:prstGeom>
+        </p:spPr>
+        <p:style>
+          <a:lnRef idx="2">
+            <a:schemeClr val="accent6">
+              <a:shade val="50000"/>
+            </a:schemeClr>
+          </a:lnRef>
+          <a:fillRef idx="1">
+            <a:schemeClr val="accent6"/>
+          </a:fillRef>
+          <a:effectRef idx="0">
+            <a:schemeClr val="accent6"/>
+          </a:effectRef>
+          <a:fontRef idx="minor">
+            <a:schemeClr val="lt1"/>
+          </a:fontRef>
+        </p:style>
+        <p:txBody>
+          <a:bodyPr rtlCol="0" anchor="ctr"/>
+          <a:lstStyle/>
+          <a:p>
+            <a:pPr algn="ctr"/>
+            <a:r>
+              <a:rPr lang="en-US" smtClean="0"/>
+              <a:t>TFM</a:t>
+            </a:r>
+          </a:p>
+        </p:txBody>
+      </p:sp>
+      <p:sp>
+        <p:nvSpPr>
+          <p:cNvPr id="5" name="Pentagon 4"/>
+          <p:cNvSpPr/>
+          <p:nvPr/>
+        </p:nvSpPr>
+        <p:spPr>
+          <a:xfrm>
+            <a:off x="2977215" y="5817037"/>
+            <a:ext cx="1152469" cy="554809"/>
+          </a:xfrm>
+          <a:prstGeom prst="homePlate">
+            <a:avLst/>
+          </a:prstGeom>
+        </p:spPr>
+        <p:style>
+          <a:lnRef idx="2">
+            <a:schemeClr val="accent1">
+              <a:shade val="50000"/>
+            </a:schemeClr>
+          </a:lnRef>
+          <a:fillRef idx="1">
+            <a:schemeClr val="accent1"/>
+          </a:fillRef>
+          <a:effectRef idx="0">
+            <a:schemeClr val="accent1"/>
+          </a:effectRef>
+          <a:fontRef idx="minor">
+            <a:schemeClr val="lt1"/>
+          </a:fontRef>
+        </p:style>
+        <p:txBody>
+          <a:bodyPr rtlCol="0" anchor="ctr"/>
+          <a:lstStyle/>
+          <a:p>
+            <a:pPr algn="ctr"/>
+            <a:r>
+              <a:rPr lang="en-US" smtClean="0"/>
+              <a:t>vehicle</a:t>
+            </a:r>
+            <a:endParaRPr lang="en-US" dirty="0"/>
+          </a:p>
+        </p:txBody>
+      </p:sp>
+      <p:sp>
+        <p:nvSpPr>
+          <p:cNvPr id="6" name="Pentagon 5"/>
+          <p:cNvSpPr/>
+          <p:nvPr/>
+        </p:nvSpPr>
+        <p:spPr>
+          <a:xfrm>
+            <a:off x="1386770" y="5946502"/>
+            <a:ext cx="1152469" cy="554809"/>
+          </a:xfrm>
+          <a:prstGeom prst="homePlate">
+            <a:avLst/>
+          </a:prstGeom>
+        </p:spPr>
+        <p:style>
+          <a:lnRef idx="2">
+            <a:schemeClr val="accent1">
+              <a:shade val="50000"/>
+            </a:schemeClr>
+          </a:lnRef>
+          <a:fillRef idx="1">
+            <a:schemeClr val="accent1"/>
+          </a:fillRef>
+          <a:effectRef idx="0">
+            <a:schemeClr val="accent1"/>
+          </a:effectRef>
+          <a:fontRef idx="minor">
+            <a:schemeClr val="lt1"/>
+          </a:fontRef>
+        </p:style>
+        <p:txBody>
+          <a:bodyPr rtlCol="0" anchor="ctr"/>
+          <a:lstStyle/>
+          <a:p>
+            <a:pPr algn="ctr"/>
+            <a:r>
+              <a:rPr lang="en-US" smtClean="0"/>
+              <a:t>vehicle</a:t>
+            </a:r>
+            <a:endParaRPr lang="en-US" dirty="0"/>
+          </a:p>
+        </p:txBody>
+      </p:sp>
+      <p:grpSp>
+        <p:nvGrpSpPr>
+          <p:cNvPr id="7" name="Group 6"/>
+          <p:cNvGrpSpPr/>
+          <p:nvPr/>
+        </p:nvGrpSpPr>
+        <p:grpSpPr>
+          <a:xfrm>
+            <a:off x="3553449" y="3995858"/>
+            <a:ext cx="3510844" cy="1562186"/>
+            <a:chOff x="3857474" y="3547696"/>
+            <a:chExt cx="3510844" cy="1562186"/>
+          </a:xfrm>
+        </p:grpSpPr>
+        <p:sp>
+          <p:nvSpPr>
+            <p:cNvPr id="8" name="Rounded Rectangle 7"/>
+            <p:cNvSpPr/>
+            <p:nvPr/>
+          </p:nvSpPr>
+          <p:spPr>
+            <a:xfrm>
+              <a:off x="3857474" y="3547696"/>
+              <a:ext cx="3510844" cy="1562186"/>
+            </a:xfrm>
+            <a:prstGeom prst="roundRect">
+              <a:avLst/>
+            </a:prstGeom>
+          </p:spPr>
+          <p:style>
+            <a:lnRef idx="1">
+              <a:schemeClr val="accent4"/>
+            </a:lnRef>
+            <a:fillRef idx="2">
+              <a:schemeClr val="accent4"/>
+            </a:fillRef>
+            <a:effectRef idx="1">
+              <a:schemeClr val="accent4"/>
+            </a:effectRef>
+            <a:fontRef idx="minor">
+              <a:schemeClr val="dk1"/>
+            </a:fontRef>
+          </p:style>
+          <p:txBody>
+            <a:bodyPr rtlCol="0" anchor="ctr"/>
+            <a:lstStyle/>
+            <a:p>
+              <a:pPr algn="ctr"/>
+              <a:endParaRPr lang="en-US"/>
+            </a:p>
+          </p:txBody>
+        </p:sp>
+        <p:sp>
+          <p:nvSpPr>
+            <p:cNvPr id="9" name="Pentagon 8"/>
+            <p:cNvSpPr/>
+            <p:nvPr/>
+          </p:nvSpPr>
+          <p:spPr>
+            <a:xfrm>
+              <a:off x="5781550" y="4385545"/>
+              <a:ext cx="1152469" cy="554809"/>
+            </a:xfrm>
+            <a:prstGeom prst="homePlate">
+              <a:avLst/>
+            </a:prstGeom>
+          </p:spPr>
+          <p:style>
+            <a:lnRef idx="2">
+              <a:schemeClr val="accent1">
+                <a:shade val="50000"/>
+              </a:schemeClr>
+            </a:lnRef>
+            <a:fillRef idx="1">
+              <a:schemeClr val="accent1"/>
+            </a:fillRef>
+            <a:effectRef idx="0">
+              <a:schemeClr val="accent1"/>
+            </a:effectRef>
+            <a:fontRef idx="minor">
+              <a:schemeClr val="lt1"/>
+            </a:fontRef>
+          </p:style>
+          <p:txBody>
+            <a:bodyPr rtlCol="0" anchor="ctr"/>
+            <a:lstStyle/>
+            <a:p>
+              <a:pPr algn="ctr"/>
+              <a:r>
+                <a:rPr lang="en-US" smtClean="0"/>
+                <a:t>vehicle</a:t>
+              </a:r>
+              <a:endParaRPr lang="en-US" dirty="0"/>
+            </a:p>
+          </p:txBody>
+        </p:sp>
+        <p:sp>
+          <p:nvSpPr>
+            <p:cNvPr id="10" name="Hexagon 9"/>
+            <p:cNvSpPr/>
+            <p:nvPr/>
+          </p:nvSpPr>
+          <p:spPr>
+            <a:xfrm>
+              <a:off x="4026129" y="3722749"/>
+              <a:ext cx="1586767" cy="1061156"/>
+            </a:xfrm>
+            <a:prstGeom prst="hexagon">
+              <a:avLst/>
+            </a:prstGeom>
+          </p:spPr>
+          <p:style>
+            <a:lnRef idx="2">
+              <a:schemeClr val="accent4">
+                <a:shade val="50000"/>
+              </a:schemeClr>
+            </a:lnRef>
+            <a:fillRef idx="1">
+              <a:schemeClr val="accent4"/>
+            </a:fillRef>
+            <a:effectRef idx="0">
+              <a:schemeClr val="accent4"/>
+            </a:effectRef>
+            <a:fontRef idx="minor">
+              <a:schemeClr val="lt1"/>
+            </a:fontRef>
+          </p:style>
+          <p:txBody>
+            <a:bodyPr rtlCol="0" anchor="ctr"/>
+            <a:lstStyle/>
+            <a:p>
+              <a:pPr algn="ctr"/>
+              <a:r>
+                <a:rPr lang="en-US" smtClean="0"/>
+                <a:t>Platoon</a:t>
+              </a:r>
+              <a:endParaRPr lang="en-US" dirty="0"/>
+            </a:p>
+          </p:txBody>
+        </p:sp>
+        <p:sp>
+          <p:nvSpPr>
+            <p:cNvPr id="11" name="Pentagon 10"/>
+            <p:cNvSpPr/>
+            <p:nvPr/>
+          </p:nvSpPr>
+          <p:spPr>
+            <a:xfrm>
+              <a:off x="5781551" y="3722749"/>
+              <a:ext cx="1152469" cy="554809"/>
+            </a:xfrm>
+            <a:prstGeom prst="homePlate">
+              <a:avLst/>
+            </a:prstGeom>
+          </p:spPr>
+          <p:style>
+            <a:lnRef idx="2">
+              <a:schemeClr val="accent1">
+                <a:shade val="50000"/>
+              </a:schemeClr>
+            </a:lnRef>
+            <a:fillRef idx="1">
+              <a:schemeClr val="accent1"/>
+            </a:fillRef>
+            <a:effectRef idx="0">
+              <a:schemeClr val="accent1"/>
+            </a:effectRef>
+            <a:fontRef idx="minor">
+              <a:schemeClr val="lt1"/>
+            </a:fontRef>
+          </p:style>
+          <p:txBody>
+            <a:bodyPr rtlCol="0" anchor="ctr"/>
+            <a:lstStyle/>
+            <a:p>
+              <a:pPr algn="ctr"/>
+              <a:r>
+                <a:rPr lang="en-US" dirty="0" smtClean="0"/>
+                <a:t>vehicle</a:t>
+              </a:r>
+              <a:endParaRPr lang="en-US" dirty="0"/>
+            </a:p>
+          </p:txBody>
+        </p:sp>
+      </p:grpSp>
+    </p:spTree>
+    <p:extLst>
+      <p:ext uri="{BB962C8B-B14F-4D97-AF65-F5344CB8AC3E}">
+        <p14:creationId xmlns:p14="http://schemas.microsoft.com/office/powerpoint/2010/main" val="1189365499"/>
+      </p:ext>
+    </p:extLst>
+  </p:cSld>
+  <p:clrMapOvr>
+    <a:masterClrMapping/>
+  </p:clrMapOvr>
+</p:sld>
+</file>
+
+<file path=ppt/slides/slide4.xml><?xml version="1.0" encoding="utf-8"?>
+<p:sld xmlns:a="http://schemas.openxmlformats.org/drawingml/2006/main" xmlns:r="http://schemas.openxmlformats.org/officeDocument/2006/relationships" xmlns:p="http://schemas.openxmlformats.org/presentationml/2006/main">
+  <p:cSld>
+    <p:spTree>
+      <p:nvGrpSpPr>
+        <p:cNvPr id="1" name=""/>
+        <p:cNvGrpSpPr/>
+        <p:nvPr/>
+      </p:nvGrpSpPr>
+      <p:grpSpPr>
+        <a:xfrm>
+          <a:off x="0" y="0"/>
+          <a:ext cx="0" cy="0"/>
+          <a:chOff x="0" y="0"/>
+          <a:chExt cx="0" cy="0"/>
+        </a:xfrm>
+      </p:grpSpPr>
+      <p:sp>
+        <p:nvSpPr>
+          <p:cNvPr id="2" name="Title 1"/>
+          <p:cNvSpPr>
+            <a:spLocks noGrp="1"/>
+          </p:cNvSpPr>
+          <p:nvPr>
+            <p:ph type="title"/>
+          </p:nvPr>
+        </p:nvSpPr>
+        <p:spPr/>
+        <p:txBody>
+          <a:bodyPr/>
+          <a:lstStyle/>
+          <a:p>
+            <a:r>
+              <a:rPr lang="en-US" dirty="0" smtClean="0"/>
+              <a:t>TFM Responsibilities</a:t>
+            </a:r>
+            <a:endParaRPr lang="en-US" dirty="0"/>
+          </a:p>
+        </p:txBody>
+      </p:sp>
+      <p:sp>
+        <p:nvSpPr>
+          <p:cNvPr id="3" name="Content Placeholder 2"/>
+          <p:cNvSpPr>
+            <a:spLocks noGrp="1"/>
+          </p:cNvSpPr>
+          <p:nvPr>
+            <p:ph idx="1"/>
+          </p:nvPr>
+        </p:nvSpPr>
+        <p:spPr/>
+        <p:txBody>
+          <a:bodyPr/>
+          <a:lstStyle/>
+          <a:p>
+            <a:r>
+              <a:rPr lang="en-US" dirty="0" smtClean="0"/>
+              <a:t>Maintain </a:t>
+            </a:r>
+            <a:r>
+              <a:rPr lang="en-US" dirty="0"/>
+              <a:t>a list of </a:t>
+            </a:r>
+            <a:r>
+              <a:rPr lang="en-US" dirty="0" smtClean="0"/>
+              <a:t>”active agents”</a:t>
+            </a:r>
+            <a:endParaRPr lang="en-US" dirty="0"/>
+          </a:p>
+          <a:p>
+            <a:pPr lvl="1"/>
+            <a:r>
+              <a:rPr lang="en-US" dirty="0" smtClean="0"/>
+              <a:t>Includes free </a:t>
+            </a:r>
+            <a:r>
+              <a:rPr lang="en-US" dirty="0"/>
+              <a:t>vehicles, </a:t>
+            </a:r>
+            <a:r>
+              <a:rPr lang="en-US" dirty="0" smtClean="0"/>
+              <a:t>platoons</a:t>
+            </a:r>
+          </a:p>
+          <a:p>
+            <a:pPr lvl="1"/>
+            <a:r>
+              <a:rPr lang="en-US" dirty="0" smtClean="0"/>
+              <a:t>Excludes follower vehicles</a:t>
+            </a:r>
+            <a:endParaRPr lang="en-US" dirty="0"/>
+          </a:p>
+          <a:p>
+            <a:r>
+              <a:rPr lang="en-US" dirty="0"/>
+              <a:t>For each active agent, check safety against all other active agents</a:t>
+            </a:r>
+          </a:p>
+          <a:p>
+            <a:pPr lvl="1"/>
+            <a:r>
+              <a:rPr lang="en-US" dirty="0"/>
+              <a:t>Combinatorial explosion here, but most of the time, only distances need to be checked</a:t>
+            </a:r>
+          </a:p>
+          <a:p>
+            <a:endParaRPr lang="en-US" dirty="0" smtClean="0"/>
+          </a:p>
+          <a:p>
+            <a:r>
+              <a:rPr lang="en-US" dirty="0" smtClean="0"/>
+              <a:t>For each vehicle in the platoon, check safety with neighbors</a:t>
+            </a:r>
+          </a:p>
+        </p:txBody>
+      </p:sp>
+    </p:spTree>
+    <p:extLst>
+      <p:ext uri="{BB962C8B-B14F-4D97-AF65-F5344CB8AC3E}">
+        <p14:creationId xmlns:p14="http://schemas.microsoft.com/office/powerpoint/2010/main" val="889254784"/>
+      </p:ext>
+    </p:extLst>
+  </p:cSld>
+  <p:clrMapOvr>
+    <a:masterClrMapping/>
+  </p:clrMapOvr>
+</p:sld>
+</file>
+
+<file path=ppt/slides/slide5.xml><?xml version="1.0" encoding="utf-8"?>
+<p:sld xmlns:a="http://schemas.openxmlformats.org/drawingml/2006/main" xmlns:r="http://schemas.openxmlformats.org/officeDocument/2006/relationships" xmlns:p="http://schemas.openxmlformats.org/presentationml/2006/main">
+  <p:cSld>
+    <p:spTree>
+      <p:nvGrpSpPr>
+        <p:cNvPr id="1" name=""/>
+        <p:cNvGrpSpPr/>
+        <p:nvPr/>
+      </p:nvGrpSpPr>
+      <p:grpSpPr>
+        <a:xfrm>
+          <a:off x="0" y="0"/>
+          <a:ext cx="0" cy="0"/>
+          <a:chOff x="0" y="0"/>
+          <a:chExt cx="0" cy="0"/>
+        </a:xfrm>
+      </p:grpSpPr>
+      <p:sp>
+        <p:nvSpPr>
+          <p:cNvPr id="4" name="Rectangle 3"/>
+          <p:cNvSpPr/>
+          <p:nvPr/>
+        </p:nvSpPr>
+        <p:spPr>
+          <a:xfrm>
+            <a:off x="835440" y="895390"/>
+            <a:ext cx="1506071" cy="927847"/>
+          </a:xfrm>
+          <a:prstGeom prst="rect">
+            <a:avLst/>
+          </a:prstGeom>
+        </p:spPr>
+        <p:style>
+          <a:lnRef idx="2">
+            <a:schemeClr val="accent6">
+              <a:shade val="50000"/>
+            </a:schemeClr>
+          </a:lnRef>
+          <a:fillRef idx="1">
+            <a:schemeClr val="accent6"/>
+          </a:fillRef>
+          <a:effectRef idx="0">
+            <a:schemeClr val="accent6"/>
+          </a:effectRef>
+          <a:fontRef idx="minor">
+            <a:schemeClr val="lt1"/>
+          </a:fontRef>
+        </p:style>
+        <p:txBody>
+          <a:bodyPr rtlCol="0" anchor="ctr"/>
+          <a:lstStyle/>
+          <a:p>
+            <a:pPr algn="ctr"/>
+            <a:r>
+              <a:rPr lang="en-US" smtClean="0"/>
+              <a:t>TFM</a:t>
+            </a:r>
+          </a:p>
+        </p:txBody>
+      </p:sp>
+      <p:sp>
+        <p:nvSpPr>
+          <p:cNvPr id="5" name="Pentagon 4"/>
+          <p:cNvSpPr/>
+          <p:nvPr/>
+        </p:nvSpPr>
+        <p:spPr>
+          <a:xfrm>
+            <a:off x="3670834" y="5678358"/>
+            <a:ext cx="1152469" cy="554809"/>
+          </a:xfrm>
+          <a:prstGeom prst="homePlate">
+            <a:avLst/>
+          </a:prstGeom>
+        </p:spPr>
+        <p:style>
+          <a:lnRef idx="2">
+            <a:schemeClr val="accent1">
+              <a:shade val="50000"/>
+            </a:schemeClr>
+          </a:lnRef>
+          <a:fillRef idx="1">
+            <a:schemeClr val="accent1"/>
+          </a:fillRef>
+          <a:effectRef idx="0">
+            <a:schemeClr val="accent1"/>
+          </a:effectRef>
+          <a:fontRef idx="minor">
+            <a:schemeClr val="lt1"/>
+          </a:fontRef>
+        </p:style>
+        <p:txBody>
+          <a:bodyPr rtlCol="0" anchor="ctr"/>
+          <a:lstStyle/>
+          <a:p>
+            <a:pPr algn="ctr"/>
+            <a:r>
+              <a:rPr lang="en-US" smtClean="0"/>
+              <a:t>vehicle</a:t>
+            </a:r>
+            <a:endParaRPr lang="en-US" dirty="0"/>
+          </a:p>
+        </p:txBody>
+      </p:sp>
+      <p:sp>
+        <p:nvSpPr>
+          <p:cNvPr id="6" name="Pentagon 5"/>
+          <p:cNvSpPr/>
+          <p:nvPr/>
+        </p:nvSpPr>
+        <p:spPr>
+          <a:xfrm>
+            <a:off x="257507" y="5681393"/>
+            <a:ext cx="1152469" cy="554809"/>
+          </a:xfrm>
+          <a:prstGeom prst="homePlate">
+            <a:avLst/>
+          </a:prstGeom>
+        </p:spPr>
+        <p:style>
+          <a:lnRef idx="2">
+            <a:schemeClr val="accent1">
+              <a:shade val="50000"/>
+            </a:schemeClr>
+          </a:lnRef>
+          <a:fillRef idx="1">
+            <a:schemeClr val="accent1"/>
+          </a:fillRef>
+          <a:effectRef idx="0">
+            <a:schemeClr val="accent1"/>
+          </a:effectRef>
+          <a:fontRef idx="minor">
+            <a:schemeClr val="lt1"/>
+          </a:fontRef>
+        </p:style>
+        <p:txBody>
+          <a:bodyPr rtlCol="0" anchor="ctr"/>
+          <a:lstStyle/>
+          <a:p>
+            <a:pPr algn="ctr"/>
+            <a:r>
+              <a:rPr lang="en-US" smtClean="0"/>
+              <a:t>vehicle</a:t>
+            </a:r>
+            <a:endParaRPr lang="en-US" dirty="0"/>
+          </a:p>
+        </p:txBody>
+      </p:sp>
+      <p:grpSp>
+        <p:nvGrpSpPr>
+          <p:cNvPr id="7" name="Group 6"/>
+          <p:cNvGrpSpPr/>
+          <p:nvPr/>
+        </p:nvGrpSpPr>
+        <p:grpSpPr>
+          <a:xfrm>
+            <a:off x="3285031" y="3500179"/>
+            <a:ext cx="3510844" cy="1562186"/>
+            <a:chOff x="3857474" y="3547696"/>
+            <a:chExt cx="3510844" cy="1562186"/>
+          </a:xfrm>
+        </p:grpSpPr>
+        <p:sp>
+          <p:nvSpPr>
+            <p:cNvPr id="8" name="Rounded Rectangle 7"/>
+            <p:cNvSpPr/>
+            <p:nvPr/>
+          </p:nvSpPr>
+          <p:spPr>
+            <a:xfrm>
+              <a:off x="3857474" y="3547696"/>
+              <a:ext cx="3510844" cy="1562186"/>
+            </a:xfrm>
+            <a:prstGeom prst="roundRect">
+              <a:avLst/>
+            </a:prstGeom>
+          </p:spPr>
+          <p:style>
+            <a:lnRef idx="1">
+              <a:schemeClr val="accent4"/>
+            </a:lnRef>
+            <a:fillRef idx="2">
+              <a:schemeClr val="accent4"/>
+            </a:fillRef>
+            <a:effectRef idx="1">
+              <a:schemeClr val="accent4"/>
+            </a:effectRef>
+            <a:fontRef idx="minor">
+              <a:schemeClr val="dk1"/>
+            </a:fontRef>
+          </p:style>
+          <p:txBody>
+            <a:bodyPr rtlCol="0" anchor="ctr"/>
+            <a:lstStyle/>
+            <a:p>
+              <a:pPr algn="ctr"/>
+              <a:endParaRPr lang="en-US"/>
+            </a:p>
+          </p:txBody>
+        </p:sp>
+        <p:sp>
+          <p:nvSpPr>
+            <p:cNvPr id="9" name="Pentagon 8"/>
+            <p:cNvSpPr/>
+            <p:nvPr/>
+          </p:nvSpPr>
+          <p:spPr>
+            <a:xfrm>
+              <a:off x="5781550" y="4385545"/>
+              <a:ext cx="1152469" cy="554809"/>
+            </a:xfrm>
+            <a:prstGeom prst="homePlate">
+              <a:avLst/>
+            </a:prstGeom>
+          </p:spPr>
+          <p:style>
+            <a:lnRef idx="2">
+              <a:schemeClr val="accent1">
+                <a:shade val="50000"/>
+              </a:schemeClr>
+            </a:lnRef>
+            <a:fillRef idx="1">
+              <a:schemeClr val="accent1"/>
+            </a:fillRef>
+            <a:effectRef idx="0">
+              <a:schemeClr val="accent1"/>
+            </a:effectRef>
+            <a:fontRef idx="minor">
+              <a:schemeClr val="lt1"/>
+            </a:fontRef>
+          </p:style>
+          <p:txBody>
+            <a:bodyPr rtlCol="0" anchor="ctr"/>
+            <a:lstStyle/>
+            <a:p>
+              <a:pPr algn="ctr"/>
+              <a:r>
+                <a:rPr lang="en-US" dirty="0" smtClean="0"/>
+                <a:t>vehicle</a:t>
+              </a:r>
+              <a:endParaRPr lang="en-US" dirty="0"/>
+            </a:p>
+          </p:txBody>
+        </p:sp>
+        <p:sp>
+          <p:nvSpPr>
+            <p:cNvPr id="10" name="Hexagon 9"/>
+            <p:cNvSpPr/>
+            <p:nvPr/>
+          </p:nvSpPr>
+          <p:spPr>
+            <a:xfrm>
+              <a:off x="4026129" y="3722749"/>
+              <a:ext cx="1586767" cy="1061156"/>
+            </a:xfrm>
+            <a:prstGeom prst="hexagon">
+              <a:avLst/>
+            </a:prstGeom>
+          </p:spPr>
+          <p:style>
+            <a:lnRef idx="2">
+              <a:schemeClr val="accent4">
+                <a:shade val="50000"/>
+              </a:schemeClr>
+            </a:lnRef>
+            <a:fillRef idx="1">
+              <a:schemeClr val="accent4"/>
+            </a:fillRef>
+            <a:effectRef idx="0">
+              <a:schemeClr val="accent4"/>
+            </a:effectRef>
+            <a:fontRef idx="minor">
+              <a:schemeClr val="lt1"/>
+            </a:fontRef>
+          </p:style>
+          <p:txBody>
+            <a:bodyPr rtlCol="0" anchor="ctr"/>
+            <a:lstStyle/>
+            <a:p>
+              <a:pPr algn="ctr"/>
+              <a:r>
+                <a:rPr lang="en-US" smtClean="0"/>
+                <a:t>Platoon</a:t>
+              </a:r>
+              <a:endParaRPr lang="en-US" dirty="0"/>
+            </a:p>
+          </p:txBody>
+        </p:sp>
+        <p:sp>
+          <p:nvSpPr>
+            <p:cNvPr id="11" name="Pentagon 10"/>
+            <p:cNvSpPr/>
+            <p:nvPr/>
+          </p:nvSpPr>
+          <p:spPr>
+            <a:xfrm>
+              <a:off x="5781551" y="3722749"/>
+              <a:ext cx="1152469" cy="554809"/>
+            </a:xfrm>
+            <a:prstGeom prst="homePlate">
+              <a:avLst/>
+            </a:prstGeom>
+          </p:spPr>
+          <p:style>
+            <a:lnRef idx="2">
+              <a:schemeClr val="accent1">
+                <a:shade val="50000"/>
+              </a:schemeClr>
+            </a:lnRef>
+            <a:fillRef idx="1">
+              <a:schemeClr val="accent1"/>
+            </a:fillRef>
+            <a:effectRef idx="0">
+              <a:schemeClr val="accent1"/>
+            </a:effectRef>
+            <a:fontRef idx="minor">
+              <a:schemeClr val="lt1"/>
+            </a:fontRef>
+          </p:style>
+          <p:txBody>
+            <a:bodyPr rtlCol="0" anchor="ctr"/>
+            <a:lstStyle/>
+            <a:p>
+              <a:pPr algn="ctr"/>
+              <a:r>
+                <a:rPr lang="en-US" dirty="0" smtClean="0"/>
+                <a:t>vehicle</a:t>
+              </a:r>
+              <a:endParaRPr lang="en-US" dirty="0"/>
+            </a:p>
+          </p:txBody>
+        </p:sp>
+      </p:grpSp>
+      <p:sp>
+        <p:nvSpPr>
+          <p:cNvPr id="12" name="Pentagon 11"/>
+          <p:cNvSpPr/>
+          <p:nvPr/>
+        </p:nvSpPr>
+        <p:spPr>
+          <a:xfrm>
+            <a:off x="257507" y="4003868"/>
+            <a:ext cx="1152469" cy="554809"/>
+          </a:xfrm>
+          <a:prstGeom prst="homePlate">
+            <a:avLst/>
+          </a:prstGeom>
+        </p:spPr>
+        <p:style>
+          <a:lnRef idx="2">
+            <a:schemeClr val="accent1">
+              <a:shade val="50000"/>
+            </a:schemeClr>
+          </a:lnRef>
+          <a:fillRef idx="1">
+            <a:schemeClr val="accent1"/>
+          </a:fillRef>
+          <a:effectRef idx="0">
+            <a:schemeClr val="accent1"/>
+          </a:effectRef>
+          <a:fontRef idx="minor">
+            <a:schemeClr val="lt1"/>
+          </a:fontRef>
+        </p:style>
+        <p:txBody>
+          <a:bodyPr rtlCol="0" anchor="ctr"/>
+          <a:lstStyle/>
+          <a:p>
+            <a:pPr algn="ctr"/>
+            <a:r>
+              <a:rPr lang="en-US" smtClean="0"/>
+              <a:t>vehicle</a:t>
+            </a:r>
+            <a:endParaRPr lang="en-US" dirty="0"/>
+          </a:p>
+        </p:txBody>
+      </p:sp>
+      <p:cxnSp>
+        <p:nvCxnSpPr>
+          <p:cNvPr id="14" name="Straight Connector 13"/>
+          <p:cNvCxnSpPr>
+            <a:stCxn id="12" idx="3"/>
+            <a:endCxn id="10" idx="3"/>
+          </p:cNvCxnSpPr>
+          <p:nvPr/>
+        </p:nvCxnSpPr>
+        <p:spPr>
+          <a:xfrm flipV="1">
+            <a:off x="1409976" y="4205810"/>
+            <a:ext cx="2043710" cy="75463"/>
+          </a:xfrm>
+          <a:prstGeom prst="line">
+            <a:avLst/>
+          </a:prstGeom>
+        </p:spPr>
+        <p:style>
+          <a:lnRef idx="3">
+            <a:schemeClr val="accent2"/>
+          </a:lnRef>
+          <a:fillRef idx="0">
+            <a:schemeClr val="accent2"/>
+          </a:fillRef>
+          <a:effectRef idx="2">
+            <a:schemeClr val="accent2"/>
+          </a:effectRef>
+          <a:fontRef idx="minor">
+            <a:schemeClr val="tx1"/>
+          </a:fontRef>
+        </p:style>
+      </p:cxnSp>
+      <p:cxnSp>
+        <p:nvCxnSpPr>
+          <p:cNvPr id="15" name="Straight Connector 14"/>
+          <p:cNvCxnSpPr>
+            <a:stCxn id="5" idx="0"/>
+            <a:endCxn id="10" idx="1"/>
+          </p:cNvCxnSpPr>
+          <p:nvPr/>
+        </p:nvCxnSpPr>
+        <p:spPr>
+          <a:xfrm flipV="1">
+            <a:off x="4108366" y="4736388"/>
+            <a:ext cx="666798" cy="941970"/>
+          </a:xfrm>
+          <a:prstGeom prst="line">
+            <a:avLst/>
+          </a:prstGeom>
+        </p:spPr>
+        <p:style>
+          <a:lnRef idx="3">
+            <a:schemeClr val="accent2"/>
+          </a:lnRef>
+          <a:fillRef idx="0">
+            <a:schemeClr val="accent2"/>
+          </a:fillRef>
+          <a:effectRef idx="2">
+            <a:schemeClr val="accent2"/>
+          </a:effectRef>
+          <a:fontRef idx="minor">
+            <a:schemeClr val="tx1"/>
+          </a:fontRef>
+        </p:style>
+      </p:cxnSp>
+      <p:cxnSp>
+        <p:nvCxnSpPr>
+          <p:cNvPr id="19" name="Straight Connector 18"/>
+          <p:cNvCxnSpPr>
+            <a:stCxn id="6" idx="0"/>
+            <a:endCxn id="10" idx="2"/>
+          </p:cNvCxnSpPr>
+          <p:nvPr/>
+        </p:nvCxnSpPr>
+        <p:spPr>
+          <a:xfrm flipV="1">
+            <a:off x="695039" y="4736388"/>
+            <a:ext cx="3023936" cy="945005"/>
+          </a:xfrm>
+          <a:prstGeom prst="line">
+            <a:avLst/>
+          </a:prstGeom>
+        </p:spPr>
+        <p:style>
+          <a:lnRef idx="3">
+            <a:schemeClr val="accent2"/>
+          </a:lnRef>
+          <a:fillRef idx="0">
+            <a:schemeClr val="accent2"/>
+          </a:fillRef>
+          <a:effectRef idx="2">
+            <a:schemeClr val="accent2"/>
+          </a:effectRef>
+          <a:fontRef idx="minor">
+            <a:schemeClr val="tx1"/>
+          </a:fontRef>
+        </p:style>
+      </p:cxnSp>
+      <p:cxnSp>
+        <p:nvCxnSpPr>
+          <p:cNvPr id="26" name="Straight Connector 25"/>
+          <p:cNvCxnSpPr>
+            <a:stCxn id="5" idx="1"/>
+            <a:endCxn id="6" idx="3"/>
+          </p:cNvCxnSpPr>
+          <p:nvPr/>
+        </p:nvCxnSpPr>
+        <p:spPr>
+          <a:xfrm flipH="1">
+            <a:off x="1409976" y="5955763"/>
+            <a:ext cx="2260858" cy="3035"/>
+          </a:xfrm>
+          <a:prstGeom prst="line">
+            <a:avLst/>
+          </a:prstGeom>
+        </p:spPr>
+        <p:style>
+          <a:lnRef idx="3">
+            <a:schemeClr val="accent2"/>
+          </a:lnRef>
+          <a:fillRef idx="0">
+            <a:schemeClr val="accent2"/>
+          </a:fillRef>
+          <a:effectRef idx="2">
+            <a:schemeClr val="accent2"/>
+          </a:effectRef>
+          <a:fontRef idx="minor">
+            <a:schemeClr val="tx1"/>
+          </a:fontRef>
+        </p:style>
+      </p:cxnSp>
+      <p:cxnSp>
+        <p:nvCxnSpPr>
+          <p:cNvPr id="29" name="Straight Connector 28"/>
+          <p:cNvCxnSpPr>
+            <a:stCxn id="6" idx="0"/>
+            <a:endCxn id="12" idx="2"/>
+          </p:cNvCxnSpPr>
+          <p:nvPr/>
+        </p:nvCxnSpPr>
+        <p:spPr>
+          <a:xfrm flipV="1">
+            <a:off x="695039" y="4558677"/>
+            <a:ext cx="0" cy="1122716"/>
+          </a:xfrm>
+          <a:prstGeom prst="line">
+            <a:avLst/>
+          </a:prstGeom>
+        </p:spPr>
+        <p:style>
+          <a:lnRef idx="3">
+            <a:schemeClr val="accent2"/>
+          </a:lnRef>
+          <a:fillRef idx="0">
+            <a:schemeClr val="accent2"/>
+          </a:fillRef>
+          <a:effectRef idx="2">
+            <a:schemeClr val="accent2"/>
+          </a:effectRef>
+          <a:fontRef idx="minor">
+            <a:schemeClr val="tx1"/>
+          </a:fontRef>
+        </p:style>
+      </p:cxnSp>
+      <p:cxnSp>
+        <p:nvCxnSpPr>
+          <p:cNvPr id="32" name="Straight Connector 31"/>
+          <p:cNvCxnSpPr>
+            <a:stCxn id="12" idx="3"/>
+            <a:endCxn id="5" idx="0"/>
+          </p:cNvCxnSpPr>
+          <p:nvPr/>
+        </p:nvCxnSpPr>
+        <p:spPr>
+          <a:xfrm>
+            <a:off x="1409976" y="4281273"/>
+            <a:ext cx="2698390" cy="1397085"/>
+          </a:xfrm>
+          <a:prstGeom prst="line">
+            <a:avLst/>
+          </a:prstGeom>
+        </p:spPr>
+        <p:style>
+          <a:lnRef idx="3">
+            <a:schemeClr val="accent2"/>
+          </a:lnRef>
+          <a:fillRef idx="0">
+            <a:schemeClr val="accent2"/>
+          </a:fillRef>
+          <a:effectRef idx="2">
+            <a:schemeClr val="accent2"/>
+          </a:effectRef>
+          <a:fontRef idx="minor">
+            <a:schemeClr val="tx1"/>
+          </a:fontRef>
+        </p:style>
+      </p:cxnSp>
+      <p:grpSp>
+        <p:nvGrpSpPr>
+          <p:cNvPr id="71" name="Group 70"/>
+          <p:cNvGrpSpPr/>
+          <p:nvPr/>
+        </p:nvGrpSpPr>
+        <p:grpSpPr>
+          <a:xfrm>
+            <a:off x="8071341" y="11061"/>
+            <a:ext cx="3510844" cy="3489118"/>
+            <a:chOff x="8010381" y="684852"/>
+            <a:chExt cx="3510844" cy="3489118"/>
+          </a:xfrm>
+        </p:grpSpPr>
+        <p:sp>
+          <p:nvSpPr>
+            <p:cNvPr id="52" name="Rounded Rectangle 51"/>
+            <p:cNvSpPr/>
+            <p:nvPr/>
+          </p:nvSpPr>
+          <p:spPr>
+            <a:xfrm>
+              <a:off x="8010381" y="684852"/>
+              <a:ext cx="3510844" cy="3489118"/>
+            </a:xfrm>
+            <a:prstGeom prst="roundRect">
+              <a:avLst/>
+            </a:prstGeom>
+          </p:spPr>
+          <p:style>
+            <a:lnRef idx="1">
+              <a:schemeClr val="accent4"/>
+            </a:lnRef>
+            <a:fillRef idx="2">
+              <a:schemeClr val="accent4"/>
+            </a:fillRef>
+            <a:effectRef idx="1">
+              <a:schemeClr val="accent4"/>
+            </a:effectRef>
+            <a:fontRef idx="minor">
+              <a:schemeClr val="dk1"/>
+            </a:fontRef>
+          </p:style>
+          <p:txBody>
+            <a:bodyPr rtlCol="0" anchor="ctr"/>
+            <a:lstStyle/>
+            <a:p>
+              <a:pPr algn="ctr"/>
+              <a:endParaRPr lang="en-US"/>
+            </a:p>
+          </p:txBody>
+        </p:sp>
+        <p:sp>
+          <p:nvSpPr>
+            <p:cNvPr id="53" name="Pentagon 52"/>
+            <p:cNvSpPr/>
+            <p:nvPr/>
+          </p:nvSpPr>
+          <p:spPr>
+            <a:xfrm>
+              <a:off x="9934458" y="2600501"/>
+              <a:ext cx="1152469" cy="554809"/>
+            </a:xfrm>
+            <a:prstGeom prst="homePlate">
+              <a:avLst/>
+            </a:prstGeom>
+          </p:spPr>
+          <p:style>
+            <a:lnRef idx="2">
+              <a:schemeClr val="accent1">
+                <a:shade val="50000"/>
+              </a:schemeClr>
+            </a:lnRef>
+            <a:fillRef idx="1">
+              <a:schemeClr val="accent1"/>
+            </a:fillRef>
+            <a:effectRef idx="0">
+              <a:schemeClr val="accent1"/>
+            </a:effectRef>
+            <a:fontRef idx="minor">
+              <a:schemeClr val="lt1"/>
+            </a:fontRef>
+          </p:style>
+          <p:txBody>
+            <a:bodyPr rtlCol="0" anchor="ctr"/>
+            <a:lstStyle/>
+            <a:p>
+              <a:pPr algn="ctr"/>
+              <a:r>
+                <a:rPr lang="en-US" dirty="0" smtClean="0"/>
+                <a:t>vehicle</a:t>
+              </a:r>
+              <a:endParaRPr lang="en-US" dirty="0"/>
+            </a:p>
+          </p:txBody>
+        </p:sp>
+        <p:sp>
+          <p:nvSpPr>
+            <p:cNvPr id="54" name="Hexagon 53"/>
+            <p:cNvSpPr/>
+            <p:nvPr/>
+          </p:nvSpPr>
+          <p:spPr>
+            <a:xfrm>
+              <a:off x="8179036" y="897483"/>
+              <a:ext cx="1586767" cy="1061156"/>
+            </a:xfrm>
+            <a:prstGeom prst="hexagon">
+              <a:avLst/>
+            </a:prstGeom>
+          </p:spPr>
+          <p:style>
+            <a:lnRef idx="2">
+              <a:schemeClr val="accent4">
+                <a:shade val="50000"/>
+              </a:schemeClr>
+            </a:lnRef>
+            <a:fillRef idx="1">
+              <a:schemeClr val="accent4"/>
+            </a:fillRef>
+            <a:effectRef idx="0">
+              <a:schemeClr val="accent4"/>
+            </a:effectRef>
+            <a:fontRef idx="minor">
+              <a:schemeClr val="lt1"/>
+            </a:fontRef>
+          </p:style>
+          <p:txBody>
+            <a:bodyPr rtlCol="0" anchor="ctr"/>
+            <a:lstStyle/>
+            <a:p>
+              <a:pPr algn="ctr"/>
+              <a:r>
+                <a:rPr lang="en-US" smtClean="0"/>
+                <a:t>Platoon</a:t>
+              </a:r>
+              <a:endParaRPr lang="en-US" dirty="0"/>
+            </a:p>
+          </p:txBody>
+        </p:sp>
+        <p:sp>
+          <p:nvSpPr>
+            <p:cNvPr id="55" name="Pentagon 54"/>
+            <p:cNvSpPr/>
+            <p:nvPr/>
+          </p:nvSpPr>
+          <p:spPr>
+            <a:xfrm>
+              <a:off x="9934458" y="834853"/>
+              <a:ext cx="1152469" cy="554809"/>
+            </a:xfrm>
+            <a:prstGeom prst="homePlate">
+              <a:avLst/>
+            </a:prstGeom>
+          </p:spPr>
+          <p:style>
+            <a:lnRef idx="2">
+              <a:schemeClr val="accent1">
+                <a:shade val="50000"/>
+              </a:schemeClr>
+            </a:lnRef>
+            <a:fillRef idx="1">
+              <a:schemeClr val="accent1"/>
+            </a:fillRef>
+            <a:effectRef idx="0">
+              <a:schemeClr val="accent1"/>
+            </a:effectRef>
+            <a:fontRef idx="minor">
+              <a:schemeClr val="lt1"/>
+            </a:fontRef>
+          </p:style>
+          <p:txBody>
+            <a:bodyPr rtlCol="0" anchor="ctr"/>
+            <a:lstStyle/>
+            <a:p>
+              <a:pPr algn="ctr"/>
+              <a:r>
+                <a:rPr lang="en-US" dirty="0" smtClean="0"/>
+                <a:t>vehicle</a:t>
+              </a:r>
+              <a:endParaRPr lang="en-US" dirty="0"/>
+            </a:p>
+          </p:txBody>
+        </p:sp>
+        <p:sp>
+          <p:nvSpPr>
+            <p:cNvPr id="56" name="Pentagon 55"/>
+            <p:cNvSpPr/>
+            <p:nvPr/>
+          </p:nvSpPr>
+          <p:spPr>
+            <a:xfrm>
+              <a:off x="9934458" y="3577783"/>
+              <a:ext cx="1152469" cy="554809"/>
+            </a:xfrm>
+            <a:prstGeom prst="homePlate">
+              <a:avLst/>
+            </a:prstGeom>
+          </p:spPr>
+          <p:style>
+            <a:lnRef idx="2">
+              <a:schemeClr val="accent1">
+                <a:shade val="50000"/>
+              </a:schemeClr>
+            </a:lnRef>
+            <a:fillRef idx="1">
+              <a:schemeClr val="accent1"/>
+            </a:fillRef>
+            <a:effectRef idx="0">
+              <a:schemeClr val="accent1"/>
+            </a:effectRef>
+            <a:fontRef idx="minor">
+              <a:schemeClr val="lt1"/>
+            </a:fontRef>
+          </p:style>
+          <p:txBody>
+            <a:bodyPr rtlCol="0" anchor="ctr"/>
+            <a:lstStyle/>
+            <a:p>
+              <a:pPr algn="ctr"/>
+              <a:r>
+                <a:rPr lang="en-US" dirty="0" smtClean="0"/>
+                <a:t>vehicle</a:t>
+              </a:r>
+              <a:endParaRPr lang="en-US" dirty="0"/>
+            </a:p>
+          </p:txBody>
+        </p:sp>
+        <p:sp>
+          <p:nvSpPr>
+            <p:cNvPr id="57" name="Pentagon 56"/>
+            <p:cNvSpPr/>
+            <p:nvPr/>
+          </p:nvSpPr>
+          <p:spPr>
+            <a:xfrm>
+              <a:off x="9934458" y="1690042"/>
+              <a:ext cx="1152469" cy="554809"/>
+            </a:xfrm>
+            <a:prstGeom prst="homePlate">
+              <a:avLst/>
+            </a:prstGeom>
+          </p:spPr>
+          <p:style>
+            <a:lnRef idx="2">
+              <a:schemeClr val="accent1">
+                <a:shade val="50000"/>
+              </a:schemeClr>
+            </a:lnRef>
+            <a:fillRef idx="1">
+              <a:schemeClr val="accent1"/>
+            </a:fillRef>
+            <a:effectRef idx="0">
+              <a:schemeClr val="accent1"/>
+            </a:effectRef>
+            <a:fontRef idx="minor">
+              <a:schemeClr val="lt1"/>
+            </a:fontRef>
+          </p:style>
+          <p:txBody>
+            <a:bodyPr rtlCol="0" anchor="ctr"/>
+            <a:lstStyle/>
+            <a:p>
+              <a:pPr algn="ctr"/>
+              <a:r>
+                <a:rPr lang="en-US" dirty="0" smtClean="0"/>
+                <a:t>vehicle</a:t>
+              </a:r>
+              <a:endParaRPr lang="en-US" dirty="0"/>
+            </a:p>
+          </p:txBody>
+        </p:sp>
+        <p:cxnSp>
+          <p:nvCxnSpPr>
+            <p:cNvPr id="59" name="Straight Connector 58"/>
+            <p:cNvCxnSpPr>
+              <a:stCxn id="57" idx="0"/>
+              <a:endCxn id="55" idx="2"/>
+            </p:cNvCxnSpPr>
+            <p:nvPr/>
+          </p:nvCxnSpPr>
+          <p:spPr>
+            <a:xfrm flipV="1">
+              <a:off x="10371990" y="1389662"/>
+              <a:ext cx="0" cy="300380"/>
+            </a:xfrm>
+            <a:prstGeom prst="line">
+              <a:avLst/>
+            </a:prstGeom>
+          </p:spPr>
+          <p:style>
+            <a:lnRef idx="3">
+              <a:schemeClr val="accent2"/>
+            </a:lnRef>
+            <a:fillRef idx="0">
+              <a:schemeClr val="accent2"/>
+            </a:fillRef>
+            <a:effectRef idx="2">
+              <a:schemeClr val="accent2"/>
+            </a:effectRef>
+            <a:fontRef idx="minor">
+              <a:schemeClr val="tx1"/>
+            </a:fontRef>
+          </p:style>
+        </p:cxnSp>
+        <p:cxnSp>
+          <p:nvCxnSpPr>
+            <p:cNvPr id="62" name="Straight Connector 61"/>
+            <p:cNvCxnSpPr>
+              <a:stCxn id="57" idx="2"/>
+              <a:endCxn id="53" idx="0"/>
+            </p:cNvCxnSpPr>
+            <p:nvPr/>
+          </p:nvCxnSpPr>
+          <p:spPr>
+            <a:xfrm>
+              <a:off x="10371990" y="2244851"/>
+              <a:ext cx="0" cy="355650"/>
+            </a:xfrm>
+            <a:prstGeom prst="line">
+              <a:avLst/>
+            </a:prstGeom>
+          </p:spPr>
+          <p:style>
+            <a:lnRef idx="3">
+              <a:schemeClr val="accent2"/>
+            </a:lnRef>
+            <a:fillRef idx="0">
+              <a:schemeClr val="accent2"/>
+            </a:fillRef>
+            <a:effectRef idx="2">
+              <a:schemeClr val="accent2"/>
+            </a:effectRef>
+            <a:fontRef idx="minor">
+              <a:schemeClr val="tx1"/>
+            </a:fontRef>
+          </p:style>
+        </p:cxnSp>
+        <p:cxnSp>
+          <p:nvCxnSpPr>
+            <p:cNvPr id="65" name="Straight Connector 64"/>
+            <p:cNvCxnSpPr>
+              <a:stCxn id="53" idx="2"/>
+              <a:endCxn id="56" idx="0"/>
+            </p:cNvCxnSpPr>
+            <p:nvPr/>
+          </p:nvCxnSpPr>
+          <p:spPr>
+            <a:xfrm>
+              <a:off x="10371990" y="3155310"/>
+              <a:ext cx="0" cy="422473"/>
+            </a:xfrm>
+            <a:prstGeom prst="line">
+              <a:avLst/>
+            </a:prstGeom>
+          </p:spPr>
+          <p:style>
+            <a:lnRef idx="3">
+              <a:schemeClr val="accent2"/>
+            </a:lnRef>
+            <a:fillRef idx="0">
+              <a:schemeClr val="accent2"/>
+            </a:fillRef>
+            <a:effectRef idx="2">
+              <a:schemeClr val="accent2"/>
+            </a:effectRef>
+            <a:fontRef idx="minor">
+              <a:schemeClr val="tx1"/>
+            </a:fontRef>
+          </p:style>
+        </p:cxnSp>
+      </p:grpSp>
+    </p:spTree>
+    <p:extLst>
+      <p:ext uri="{BB962C8B-B14F-4D97-AF65-F5344CB8AC3E}">
+        <p14:creationId xmlns:p14="http://schemas.microsoft.com/office/powerpoint/2010/main" val="1430699571"/>
+      </p:ext>
+    </p:extLst>
+  </p:cSld>
+  <p:clrMapOvr>
+    <a:masterClrMapping/>
+  </p:clrMapOvr>
+</p:sld>
+</file>
+
+<file path=ppt/slides/slide6.xml><?xml version="1.0" encoding="utf-8"?>
+<p:sld xmlns:a="http://schemas.openxmlformats.org/drawingml/2006/main" xmlns:r="http://schemas.openxmlformats.org/officeDocument/2006/relationships" xmlns:p="http://schemas.openxmlformats.org/presentationml/2006/main">
+  <p:cSld>
+    <p:spTree>
+      <p:nvGrpSpPr>
+        <p:cNvPr id="1" name=""/>
+        <p:cNvGrpSpPr/>
+        <p:nvPr/>
+      </p:nvGrpSpPr>
+      <p:grpSpPr>
+        <a:xfrm>
+          <a:off x="0" y="0"/>
+          <a:ext cx="0" cy="0"/>
+          <a:chOff x="0" y="0"/>
+          <a:chExt cx="0" cy="0"/>
+        </a:xfrm>
+      </p:grpSpPr>
+      <p:sp>
+        <p:nvSpPr>
+          <p:cNvPr id="2" name="Title 1"/>
+          <p:cNvSpPr>
+            <a:spLocks noGrp="1"/>
+          </p:cNvSpPr>
+          <p:nvPr>
+            <p:ph type="title"/>
+          </p:nvPr>
+        </p:nvSpPr>
+        <p:spPr/>
+        <p:txBody>
+          <a:bodyPr/>
+          <a:lstStyle/>
+          <a:p>
+            <a:r>
+              <a:rPr lang="en-US" dirty="0" smtClean="0"/>
+              <a:t>Number of safety checks</a:t>
+            </a:r>
+            <a:endParaRPr lang="en-US" dirty="0"/>
+          </a:p>
+        </p:txBody>
+      </p:sp>
+      <p:sp>
+        <p:nvSpPr>
+          <p:cNvPr id="3" name="Content Placeholder 2"/>
+          <p:cNvSpPr>
+            <a:spLocks noGrp="1"/>
+          </p:cNvSpPr>
+          <p:nvPr>
+            <p:ph idx="1"/>
+          </p:nvPr>
+        </p:nvSpPr>
+        <p:spPr/>
+        <p:txBody>
+          <a:bodyPr/>
+          <a:lstStyle/>
+          <a:p>
+            <a:r>
+              <a:rPr lang="en-US" dirty="0" smtClean="0"/>
+              <a:t>All N vehicles are free:</a:t>
+            </a:r>
+          </a:p>
+          <a:p>
+            <a:pPr lvl="1"/>
+            <a:r>
+              <a:rPr lang="en-US" dirty="0" smtClean="0"/>
+              <a:t>N choose 2</a:t>
+            </a:r>
+          </a:p>
+          <a:p>
+            <a:pPr lvl="1"/>
+            <a:r>
+              <a:rPr lang="en-US" dirty="0" smtClean="0"/>
+              <a:t>Combinatorial, doesn’t necessarily guarantee safety especially for large N</a:t>
+            </a:r>
+          </a:p>
+          <a:p>
+            <a:pPr lvl="1"/>
+            <a:r>
+              <a:rPr lang="en-US" dirty="0" smtClean="0"/>
+              <a:t>N = 15 =&gt; 105 checks</a:t>
+            </a:r>
+          </a:p>
+          <a:p>
+            <a:pPr lvl="1"/>
+            <a:endParaRPr lang="en-US" dirty="0"/>
+          </a:p>
+          <a:p>
+            <a:r>
+              <a:rPr lang="en-US" dirty="0" smtClean="0"/>
+              <a:t>n free vehicles</a:t>
+            </a:r>
+            <a:r>
+              <a:rPr lang="en-US" dirty="0"/>
+              <a:t> </a:t>
+            </a:r>
+            <a:r>
+              <a:rPr lang="en-US" dirty="0" smtClean="0"/>
+              <a:t>+ p platoons with k vehicles in each</a:t>
+            </a:r>
+          </a:p>
+          <a:p>
+            <a:pPr lvl="1"/>
+            <a:r>
+              <a:rPr lang="en-US" dirty="0" smtClean="0"/>
+              <a:t>(</a:t>
+            </a:r>
+            <a:r>
+              <a:rPr lang="en-US" dirty="0" err="1" smtClean="0"/>
+              <a:t>n+p</a:t>
+            </a:r>
+            <a:r>
+              <a:rPr lang="en-US" dirty="0" smtClean="0"/>
+              <a:t>) choose 2 + (k-1)*p</a:t>
+            </a:r>
+          </a:p>
+          <a:p>
+            <a:pPr lvl="1"/>
+            <a:r>
+              <a:rPr lang="en-US" dirty="0" smtClean="0"/>
+              <a:t>p = 3, k = 4, n = 3 (so that n + </a:t>
+            </a:r>
+            <a:r>
+              <a:rPr lang="en-US" dirty="0" err="1" smtClean="0"/>
+              <a:t>pk</a:t>
+            </a:r>
+            <a:r>
+              <a:rPr lang="en-US" dirty="0" smtClean="0"/>
+              <a:t> = N = 15) =&gt; 6 choose 2 + 3 * 3 = 24 checks</a:t>
+            </a:r>
+          </a:p>
+          <a:p>
+            <a:pPr marL="457200" lvl="1" indent="0">
+              <a:buNone/>
+            </a:pPr>
+            <a:endParaRPr lang="en-US" dirty="0" smtClean="0"/>
+          </a:p>
+          <a:p>
+            <a:pPr lvl="1"/>
+            <a:endParaRPr lang="en-US" dirty="0"/>
+          </a:p>
+        </p:txBody>
+      </p:sp>
+      <p:pic>
+        <p:nvPicPr>
+          <p:cNvPr id="5" name="Picture 4"/>
+          <p:cNvPicPr>
+            <a:picLocks noChangeAspect="1"/>
+          </p:cNvPicPr>
+          <p:nvPr/>
+        </p:nvPicPr>
+        <p:blipFill>
+          <a:blip r:embed="rId2">
+            <a:extLst>
+              <a:ext uri="{28A0092B-C50C-407E-A947-70E740481C1C}">
+                <a14:useLocalDpi xmlns:a14="http://schemas.microsoft.com/office/drawing/2010/main" val="0"/>
+              </a:ext>
+            </a:extLst>
+          </a:blip>
+          <a:stretch>
+            <a:fillRect/>
+          </a:stretch>
+        </p:blipFill>
+        <p:spPr>
+          <a:xfrm>
+            <a:off x="2266822" y="662146"/>
+            <a:ext cx="7112000" cy="5334000"/>
+          </a:xfrm>
+          <a:prstGeom prst="rect">
+            <a:avLst/>
+          </a:prstGeom>
+        </p:spPr>
+      </p:pic>
+    </p:spTree>
+    <p:extLst>
+      <p:ext uri="{BB962C8B-B14F-4D97-AF65-F5344CB8AC3E}">
+        <p14:creationId xmlns:p14="http://schemas.microsoft.com/office/powerpoint/2010/main" val="410127925"/>
+      </p:ext>
+    </p:extLst>
+  </p:cSld>
+  <p:clrMapOvr>
+    <a:masterClrMapping/>
+  </p:clrMapOvr>
+</p:sld>
+</file>
+
+<file path=ppt/slides/slide7.xml><?xml version="1.0" encoding="utf-8"?>
+<p:sld xmlns:a="http://schemas.openxmlformats.org/drawingml/2006/main" xmlns:r="http://schemas.openxmlformats.org/officeDocument/2006/relationships" xmlns:p="http://schemas.openxmlformats.org/presentationml/2006/main">
+  <p:cSld>
+    <p:spTree>
+      <p:nvGrpSpPr>
+        <p:cNvPr id="1" name=""/>
+        <p:cNvGrpSpPr/>
+        <p:nvPr/>
+      </p:nvGrpSpPr>
+      <p:grpSpPr>
+        <a:xfrm>
+          <a:off x="0" y="0"/>
+          <a:ext cx="0" cy="0"/>
+          <a:chOff x="0" y="0"/>
+          <a:chExt cx="0" cy="0"/>
+        </a:xfrm>
+      </p:grpSpPr>
+      <p:sp>
+        <p:nvSpPr>
+          <p:cNvPr id="2" name="Title 1"/>
+          <p:cNvSpPr>
+            <a:spLocks noGrp="1"/>
+          </p:cNvSpPr>
+          <p:nvPr>
+            <p:ph type="title"/>
+          </p:nvPr>
+        </p:nvSpPr>
+        <p:spPr/>
+        <p:txBody>
+          <a:bodyPr/>
+          <a:lstStyle/>
+          <a:p>
+            <a:r>
+              <a:rPr lang="en-US" dirty="0" smtClean="0"/>
+              <a:t>Type of safety checks</a:t>
+            </a:r>
+            <a:endParaRPr lang="en-US" dirty="0"/>
+          </a:p>
+        </p:txBody>
+      </p:sp>
+      <p:sp>
+        <p:nvSpPr>
+          <p:cNvPr id="3" name="Content Placeholder 2"/>
+          <p:cNvSpPr>
+            <a:spLocks noGrp="1"/>
+          </p:cNvSpPr>
+          <p:nvPr>
+            <p:ph idx="1"/>
+          </p:nvPr>
+        </p:nvSpPr>
+        <p:spPr/>
+        <p:txBody>
+          <a:bodyPr/>
+          <a:lstStyle/>
+          <a:p>
+            <a:r>
+              <a:rPr lang="en-US" dirty="0" smtClean="0"/>
+              <a:t>Active agents</a:t>
+            </a:r>
+          </a:p>
+          <a:p>
+            <a:pPr lvl="1"/>
+            <a:r>
+              <a:rPr lang="en-US" dirty="0" smtClean="0"/>
+              <a:t>Quick check: distance</a:t>
+            </a:r>
+          </a:p>
+          <a:p>
+            <a:pPr lvl="1"/>
+            <a:r>
+              <a:rPr lang="en-US" dirty="0" smtClean="0"/>
+              <a:t>Detailed check: safety reachable set</a:t>
+            </a:r>
+          </a:p>
+          <a:p>
+            <a:pPr lvl="1"/>
+            <a:endParaRPr lang="en-US" dirty="0"/>
+          </a:p>
+          <a:p>
+            <a:r>
+              <a:rPr lang="en-US" dirty="0" smtClean="0"/>
+              <a:t>Vehicles within platoons</a:t>
+            </a:r>
+          </a:p>
+          <a:p>
+            <a:pPr lvl="1"/>
+            <a:r>
+              <a:rPr lang="en-US" dirty="0" smtClean="0"/>
+              <a:t>Quick check: state error (with respect to phantom state)</a:t>
+            </a:r>
+          </a:p>
+          <a:p>
+            <a:pPr lvl="1"/>
+            <a:r>
+              <a:rPr lang="en-US" dirty="0" smtClean="0"/>
+              <a:t>Detailed check: safety reachable set</a:t>
+            </a:r>
+            <a:endParaRPr lang="en-US" dirty="0"/>
+          </a:p>
+        </p:txBody>
+      </p:sp>
+    </p:spTree>
+    <p:extLst>
+      <p:ext uri="{BB962C8B-B14F-4D97-AF65-F5344CB8AC3E}">
+        <p14:creationId xmlns:p14="http://schemas.microsoft.com/office/powerpoint/2010/main" val="1856298181"/>
+      </p:ext>
+    </p:extLst>
+  </p:cSld>
+  <p:clrMapOvr>
+    <a:masterClrMapping/>
+  </p:clrMapOvr>
 </p:sld>
 </file>
 

</xml_diff>

<commit_message>
Still fixing double integrator problem (getting stuck at switching curve near 0 velocity)
</commit_message>
<xml_diff>
--- a/docs/Airspace Structure.pptx
+++ b/docs/Airspace Structure.pptx
@@ -6052,7 +6052,7 @@
         </p:nvGrpSpPr>
         <p:grpSpPr>
           <a:xfrm>
-            <a:off x="8071341" y="11061"/>
+            <a:off x="7949421" y="1630917"/>
             <a:ext cx="3510844" cy="3489118"/>
             <a:chOff x="8010381" y="684852"/>
             <a:chExt cx="3510844" cy="3489118"/>
@@ -6592,7 +6592,7 @@
         </p:blipFill>
         <p:spPr>
           <a:xfrm>
-            <a:off x="2266822" y="662146"/>
+            <a:off x="2925190" y="842963"/>
             <a:ext cx="7112000" cy="5334000"/>
           </a:xfrm>
           <a:prstGeom prst="rect">

</xml_diff>